<commit_message>
Renamed Bonadrone => BonadroneBoard for consistency
</commit_message>
<xml_diff>
--- a/extras/media/boards.pptx
+++ b/extras/media/boards.pptx
@@ -1388,151 +1388,7 @@
               <a:rPr b="0" lang="en-US" sz="4400" spc="-1" strike="noStrike">
                 <a:latin typeface="Arial"/>
               </a:rPr>
-              <a:t>C</a:t>
-            </a:r>
-            <a:r>
-              <a:rPr b="0" lang="en-US" sz="4400" spc="-1" strike="noStrike">
-                <a:latin typeface="Arial"/>
-              </a:rPr>
-              <a:t>li</a:t>
-            </a:r>
-            <a:r>
-              <a:rPr b="0" lang="en-US" sz="4400" spc="-1" strike="noStrike">
-                <a:latin typeface="Arial"/>
-              </a:rPr>
-              <a:t>c</a:t>
-            </a:r>
-            <a:r>
-              <a:rPr b="0" lang="en-US" sz="4400" spc="-1" strike="noStrike">
-                <a:latin typeface="Arial"/>
-              </a:rPr>
-              <a:t>k </a:t>
-            </a:r>
-            <a:r>
-              <a:rPr b="0" lang="en-US" sz="4400" spc="-1" strike="noStrike">
-                <a:latin typeface="Arial"/>
-              </a:rPr>
-              <a:t>t</a:t>
-            </a:r>
-            <a:r>
-              <a:rPr b="0" lang="en-US" sz="4400" spc="-1" strike="noStrike">
-                <a:latin typeface="Arial"/>
-              </a:rPr>
-              <a:t>o </a:t>
-            </a:r>
-            <a:r>
-              <a:rPr b="0" lang="en-US" sz="4400" spc="-1" strike="noStrike">
-                <a:latin typeface="Arial"/>
-              </a:rPr>
-              <a:t>e</a:t>
-            </a:r>
-            <a:r>
-              <a:rPr b="0" lang="en-US" sz="4400" spc="-1" strike="noStrike">
-                <a:latin typeface="Arial"/>
-              </a:rPr>
-              <a:t>d</a:t>
-            </a:r>
-            <a:r>
-              <a:rPr b="0" lang="en-US" sz="4400" spc="-1" strike="noStrike">
-                <a:latin typeface="Arial"/>
-              </a:rPr>
-              <a:t>it </a:t>
-            </a:r>
-            <a:r>
-              <a:rPr b="0" lang="en-US" sz="4400" spc="-1" strike="noStrike">
-                <a:latin typeface="Arial"/>
-              </a:rPr>
-              <a:t>t</a:t>
-            </a:r>
-            <a:r>
-              <a:rPr b="0" lang="en-US" sz="4400" spc="-1" strike="noStrike">
-                <a:latin typeface="Arial"/>
-              </a:rPr>
-              <a:t>h</a:t>
-            </a:r>
-            <a:r>
-              <a:rPr b="0" lang="en-US" sz="4400" spc="-1" strike="noStrike">
-                <a:latin typeface="Arial"/>
-              </a:rPr>
-              <a:t>e </a:t>
-            </a:r>
-            <a:r>
-              <a:rPr b="0" lang="en-US" sz="4400" spc="-1" strike="noStrike">
-                <a:latin typeface="Arial"/>
-              </a:rPr>
-              <a:t>ti</a:t>
-            </a:r>
-            <a:r>
-              <a:rPr b="0" lang="en-US" sz="4400" spc="-1" strike="noStrike">
-                <a:latin typeface="Arial"/>
-              </a:rPr>
-              <a:t>tl</a:t>
-            </a:r>
-            <a:r>
-              <a:rPr b="0" lang="en-US" sz="4400" spc="-1" strike="noStrike">
-                <a:latin typeface="Arial"/>
-              </a:rPr>
-              <a:t>e </a:t>
-            </a:r>
-            <a:r>
-              <a:rPr b="0" lang="en-US" sz="4400" spc="-1" strike="noStrike">
-                <a:latin typeface="Arial"/>
-              </a:rPr>
-              <a:t>t</a:t>
-            </a:r>
-            <a:r>
-              <a:rPr b="0" lang="en-US" sz="4400" spc="-1" strike="noStrike">
-                <a:latin typeface="Arial"/>
-              </a:rPr>
-              <a:t>e</a:t>
-            </a:r>
-            <a:r>
-              <a:rPr b="0" lang="en-US" sz="4400" spc="-1" strike="noStrike">
-                <a:latin typeface="Arial"/>
-              </a:rPr>
-              <a:t>x</a:t>
-            </a:r>
-            <a:r>
-              <a:rPr b="0" lang="en-US" sz="4400" spc="-1" strike="noStrike">
-                <a:latin typeface="Arial"/>
-              </a:rPr>
-              <a:t>t </a:t>
-            </a:r>
-            <a:r>
-              <a:rPr b="0" lang="en-US" sz="4400" spc="-1" strike="noStrike">
-                <a:latin typeface="Arial"/>
-              </a:rPr>
-              <a:t>f</a:t>
-            </a:r>
-            <a:r>
-              <a:rPr b="0" lang="en-US" sz="4400" spc="-1" strike="noStrike">
-                <a:latin typeface="Arial"/>
-              </a:rPr>
-              <a:t>o</a:t>
-            </a:r>
-            <a:r>
-              <a:rPr b="0" lang="en-US" sz="4400" spc="-1" strike="noStrike">
-                <a:latin typeface="Arial"/>
-              </a:rPr>
-              <a:t>r</a:t>
-            </a:r>
-            <a:r>
-              <a:rPr b="0" lang="en-US" sz="4400" spc="-1" strike="noStrike">
-                <a:latin typeface="Arial"/>
-              </a:rPr>
-              <a:t>m</a:t>
-            </a:r>
-            <a:r>
-              <a:rPr b="0" lang="en-US" sz="4400" spc="-1" strike="noStrike">
-                <a:latin typeface="Arial"/>
-              </a:rPr>
-              <a:t>a</a:t>
-            </a:r>
-            <a:r>
-              <a:rPr b="0" lang="en-US" sz="4400" spc="-1" strike="noStrike">
-                <a:latin typeface="Arial"/>
-              </a:rPr>
-              <a:t>t</a:t>
+              <a:t>Click to edit the title text format</a:t>
             </a:r>
             <a:endParaRPr b="0" lang="en-US" sz="4400" spc="-1" strike="noStrike">
               <a:latin typeface="Arial"/>
@@ -1911,7 +1767,7 @@
         </p:nvSpPr>
         <p:spPr>
           <a:xfrm>
-            <a:off x="5303520" y="2885760"/>
+            <a:off x="7853760" y="2926080"/>
             <a:ext cx="1473120" cy="314640"/>
           </a:xfrm>
           <a:prstGeom prst="rect">
@@ -1960,7 +1816,7 @@
         </p:nvSpPr>
         <p:spPr>
           <a:xfrm>
-            <a:off x="274320" y="1697040"/>
+            <a:off x="274320" y="3566160"/>
             <a:ext cx="1554480" cy="314640"/>
           </a:xfrm>
           <a:prstGeom prst="rect">
@@ -2009,7 +1865,7 @@
         </p:nvSpPr>
         <p:spPr>
           <a:xfrm>
-            <a:off x="1828800" y="1697040"/>
+            <a:off x="4937760" y="3617280"/>
             <a:ext cx="2286000" cy="314640"/>
           </a:xfrm>
           <a:prstGeom prst="rect">
@@ -2122,14 +1978,14 @@
         <p:nvCxnSpPr>
           <p:cNvPr id="46" name="Line 9"/>
           <p:cNvCxnSpPr>
-            <a:endCxn id="41" idx="0"/>
+            <a:endCxn id="41" idx="1"/>
           </p:cNvCxnSpPr>
           <p:nvPr/>
         </p:nvCxnSpPr>
         <p:spPr>
           <a:xfrm>
             <a:off x="5755680" y="1960920"/>
-            <a:ext cx="284760" cy="925200"/>
+            <a:ext cx="2098440" cy="1122840"/>
           </a:xfrm>
           <a:prstGeom prst="straightConnector1">
             <a:avLst/>
@@ -2249,13 +2105,470 @@
           <p:cNvPr id="49" name="Line 12"/>
           <p:cNvCxnSpPr>
             <a:stCxn id="47" idx="0"/>
+            <a:endCxn id="42" idx="2"/>
           </p:cNvCxnSpPr>
           <p:nvPr/>
         </p:nvCxnSpPr>
         <p:spPr>
           <a:xfrm flipH="1" flipV="1">
-            <a:off x="872280" y="2165760"/>
-            <a:ext cx="1724040" cy="2208600"/>
+            <a:off x="1051560" y="3880800"/>
+            <a:ext cx="1544760" cy="493560"/>
+          </a:xfrm>
+          <a:prstGeom prst="straightConnector1">
+            <a:avLst/>
+          </a:prstGeom>
+          <a:ln>
+            <a:solidFill>
+              <a:srgbClr val="000000"/>
+            </a:solidFill>
+          </a:ln>
+        </p:spPr>
+      </p:cxnSp>
+      <p:sp>
+        <p:nvSpPr>
+          <p:cNvPr id="50" name="CustomShape 13"/>
+          <p:cNvSpPr/>
+          <p:nvPr/>
+        </p:nvSpPr>
+        <p:spPr>
+          <a:xfrm>
+            <a:off x="753840" y="5120640"/>
+            <a:ext cx="892080" cy="314640"/>
+          </a:xfrm>
+          <a:prstGeom prst="rect">
+            <a:avLst/>
+          </a:prstGeom>
+          <a:noFill/>
+          <a:ln>
+            <a:noFill/>
+          </a:ln>
+        </p:spPr>
+        <p:style>
+          <a:lnRef idx="0"/>
+          <a:fillRef idx="0"/>
+          <a:effectRef idx="0"/>
+          <a:fontRef idx="minor"/>
+        </p:style>
+        <p:txBody>
+          <a:bodyPr lIns="90000" rIns="90000" tIns="45000" bIns="45000"/>
+          <a:p>
+            <a:pPr>
+              <a:lnSpc>
+                <a:spcPct val="100000"/>
+              </a:lnSpc>
+            </a:pPr>
+            <a:r>
+              <a:rPr b="0" lang="en-US" sz="1400" spc="-1" strike="noStrike">
+                <a:solidFill>
+                  <a:srgbClr val="000000"/>
+                </a:solidFill>
+                <a:latin typeface="Arial"/>
+                <a:ea typeface="DejaVu Sans"/>
+              </a:rPr>
+              <a:t>Ladybug</a:t>
+            </a:r>
+            <a:endParaRPr b="0" lang="en-US" sz="1400" spc="-1" strike="noStrike">
+              <a:latin typeface="Arial"/>
+            </a:endParaRPr>
+          </a:p>
+        </p:txBody>
+      </p:sp>
+      <p:sp>
+        <p:nvSpPr>
+          <p:cNvPr id="51" name="CustomShape 14"/>
+          <p:cNvSpPr/>
+          <p:nvPr/>
+        </p:nvSpPr>
+        <p:spPr>
+          <a:xfrm>
+            <a:off x="2595960" y="5120640"/>
+            <a:ext cx="1103760" cy="314640"/>
+          </a:xfrm>
+          <a:prstGeom prst="rect">
+            <a:avLst/>
+          </a:prstGeom>
+          <a:noFill/>
+          <a:ln>
+            <a:noFill/>
+          </a:ln>
+        </p:spPr>
+        <p:style>
+          <a:lnRef idx="0"/>
+          <a:fillRef idx="0"/>
+          <a:effectRef idx="0"/>
+          <a:fontRef idx="minor"/>
+        </p:style>
+        <p:txBody>
+          <a:bodyPr lIns="90000" rIns="90000" tIns="45000" bIns="45000"/>
+          <a:p>
+            <a:pPr>
+              <a:lnSpc>
+                <a:spcPct val="100000"/>
+              </a:lnSpc>
+            </a:pPr>
+            <a:r>
+              <a:rPr b="0" lang="en-US" sz="1400" spc="-1" strike="noStrike">
+                <a:solidFill>
+                  <a:srgbClr val="000000"/>
+                </a:solidFill>
+                <a:latin typeface="Arial"/>
+                <a:ea typeface="DejaVu Sans"/>
+              </a:rPr>
+              <a:t>SuperFly</a:t>
+            </a:r>
+            <a:endParaRPr b="0" lang="en-US" sz="1400" spc="-1" strike="noStrike">
+              <a:latin typeface="Arial"/>
+            </a:endParaRPr>
+          </a:p>
+        </p:txBody>
+      </p:sp>
+      <p:cxnSp>
+        <p:nvCxnSpPr>
+          <p:cNvPr id="52" name="Line 15"/>
+          <p:cNvCxnSpPr>
+            <a:endCxn id="50" idx="0"/>
+          </p:cNvCxnSpPr>
+          <p:nvPr/>
+        </p:nvCxnSpPr>
+        <p:spPr>
+          <a:xfrm flipH="1">
+            <a:off x="1199880" y="4688640"/>
+            <a:ext cx="1396440" cy="432360"/>
+          </a:xfrm>
+          <a:prstGeom prst="straightConnector1">
+            <a:avLst/>
+          </a:prstGeom>
+          <a:ln>
+            <a:solidFill>
+              <a:srgbClr val="000000"/>
+            </a:solidFill>
+          </a:ln>
+        </p:spPr>
+      </p:cxnSp>
+      <p:cxnSp>
+        <p:nvCxnSpPr>
+          <p:cNvPr id="53" name="Line 16"/>
+          <p:cNvCxnSpPr>
+            <a:endCxn id="51" idx="0"/>
+          </p:cNvCxnSpPr>
+          <p:nvPr/>
+        </p:nvCxnSpPr>
+        <p:spPr>
+          <a:xfrm>
+            <a:off x="2595960" y="4688640"/>
+            <a:ext cx="552240" cy="432360"/>
+          </a:xfrm>
+          <a:prstGeom prst="straightConnector1">
+            <a:avLst/>
+          </a:prstGeom>
+          <a:ln>
+            <a:solidFill>
+              <a:srgbClr val="000000"/>
+            </a:solidFill>
+          </a:ln>
+        </p:spPr>
+      </p:cxnSp>
+      <p:sp>
+        <p:nvSpPr>
+          <p:cNvPr id="54" name="CustomShape 17"/>
+          <p:cNvSpPr/>
+          <p:nvPr/>
+        </p:nvSpPr>
+        <p:spPr>
+          <a:xfrm>
+            <a:off x="5114160" y="4348800"/>
+            <a:ext cx="1103760" cy="314640"/>
+          </a:xfrm>
+          <a:prstGeom prst="rect">
+            <a:avLst/>
+          </a:prstGeom>
+          <a:noFill/>
+          <a:ln>
+            <a:noFill/>
+          </a:ln>
+        </p:spPr>
+        <p:style>
+          <a:lnRef idx="0"/>
+          <a:fillRef idx="0"/>
+          <a:effectRef idx="0"/>
+          <a:fontRef idx="minor"/>
+        </p:style>
+        <p:txBody>
+          <a:bodyPr lIns="90000" rIns="90000" tIns="45000" bIns="45000"/>
+          <a:p>
+            <a:pPr>
+              <a:lnSpc>
+                <a:spcPct val="100000"/>
+              </a:lnSpc>
+            </a:pPr>
+            <a:r>
+              <a:rPr b="0" lang="en-US" sz="1400" spc="-1" strike="noStrike">
+                <a:solidFill>
+                  <a:srgbClr val="000000"/>
+                </a:solidFill>
+                <a:latin typeface="Arial"/>
+                <a:ea typeface="DejaVu Sans"/>
+              </a:rPr>
+              <a:t>Bonadrone</a:t>
+            </a:r>
+            <a:endParaRPr b="0" lang="en-US" sz="1400" spc="-1" strike="noStrike">
+              <a:latin typeface="Arial"/>
+            </a:endParaRPr>
+          </a:p>
+        </p:txBody>
+      </p:sp>
+      <p:cxnSp>
+        <p:nvCxnSpPr>
+          <p:cNvPr id="55" name="Line 18"/>
+          <p:cNvCxnSpPr>
+            <a:endCxn id="54" idx="0"/>
+          </p:cNvCxnSpPr>
+          <p:nvPr/>
+        </p:nvCxnSpPr>
+        <p:spPr>
+          <a:xfrm>
+            <a:off x="3394440" y="3972240"/>
+            <a:ext cx="2271960" cy="376920"/>
+          </a:xfrm>
+          <a:prstGeom prst="straightConnector1">
+            <a:avLst/>
+          </a:prstGeom>
+          <a:ln>
+            <a:solidFill>
+              <a:srgbClr val="000000"/>
+            </a:solidFill>
+          </a:ln>
+        </p:spPr>
+      </p:cxnSp>
+      <p:cxnSp>
+        <p:nvCxnSpPr>
+          <p:cNvPr id="56" name="Line 19"/>
+          <p:cNvCxnSpPr>
+            <a:stCxn id="43" idx="2"/>
+            <a:endCxn id="54" idx="0"/>
+          </p:cNvCxnSpPr>
+          <p:nvPr/>
+        </p:nvCxnSpPr>
+        <p:spPr>
+          <a:xfrm flipH="1">
+            <a:off x="5666040" y="3931920"/>
+            <a:ext cx="415080" cy="417240"/>
+          </a:xfrm>
+          <a:prstGeom prst="straightConnector1">
+            <a:avLst/>
+          </a:prstGeom>
+          <a:ln>
+            <a:solidFill>
+              <a:srgbClr val="000000"/>
+            </a:solidFill>
+          </a:ln>
+        </p:spPr>
+      </p:cxnSp>
+      <p:cxnSp>
+        <p:nvCxnSpPr>
+          <p:cNvPr id="57" name="Line 20"/>
+          <p:cNvCxnSpPr>
+            <a:stCxn id="54" idx="2"/>
+          </p:cNvCxnSpPr>
+          <p:nvPr/>
+        </p:nvCxnSpPr>
+        <p:spPr>
+          <a:xfrm flipH="1">
+            <a:off x="4568760" y="4663440"/>
+            <a:ext cx="1097640" cy="457560"/>
+          </a:xfrm>
+          <a:prstGeom prst="straightConnector1">
+            <a:avLst/>
+          </a:prstGeom>
+          <a:ln>
+            <a:solidFill>
+              <a:srgbClr val="000000"/>
+            </a:solidFill>
+          </a:ln>
+        </p:spPr>
+      </p:cxnSp>
+      <p:sp>
+        <p:nvSpPr>
+          <p:cNvPr id="58" name="CustomShape 21"/>
+          <p:cNvSpPr/>
+          <p:nvPr/>
+        </p:nvSpPr>
+        <p:spPr>
+          <a:xfrm>
+            <a:off x="4016880" y="5120640"/>
+            <a:ext cx="1103760" cy="314640"/>
+          </a:xfrm>
+          <a:prstGeom prst="rect">
+            <a:avLst/>
+          </a:prstGeom>
+          <a:noFill/>
+          <a:ln>
+            <a:noFill/>
+          </a:ln>
+        </p:spPr>
+        <p:style>
+          <a:lnRef idx="0"/>
+          <a:fillRef idx="0"/>
+          <a:effectRef idx="0"/>
+          <a:fontRef idx="minor"/>
+        </p:style>
+        <p:txBody>
+          <a:bodyPr lIns="90000" rIns="90000" tIns="45000" bIns="45000"/>
+          <a:p>
+            <a:pPr>
+              <a:lnSpc>
+                <a:spcPct val="100000"/>
+              </a:lnSpc>
+            </a:pPr>
+            <a:r>
+              <a:rPr b="0" lang="en-US" sz="1400" spc="-1" strike="noStrike">
+                <a:solidFill>
+                  <a:srgbClr val="000000"/>
+                </a:solidFill>
+                <a:latin typeface="Arial"/>
+                <a:ea typeface="DejaVu Sans"/>
+              </a:rPr>
+              <a:t>BonadroneStandard</a:t>
+            </a:r>
+            <a:endParaRPr b="0" lang="en-US" sz="1400" spc="-1" strike="noStrike">
+              <a:latin typeface="Arial"/>
+            </a:endParaRPr>
+          </a:p>
+        </p:txBody>
+      </p:sp>
+      <p:sp>
+        <p:nvSpPr>
+          <p:cNvPr id="59" name="CustomShape 22"/>
+          <p:cNvSpPr/>
+          <p:nvPr/>
+        </p:nvSpPr>
+        <p:spPr>
+          <a:xfrm>
+            <a:off x="5132880" y="5114880"/>
+            <a:ext cx="1103760" cy="314640"/>
+          </a:xfrm>
+          <a:prstGeom prst="rect">
+            <a:avLst/>
+          </a:prstGeom>
+          <a:noFill/>
+          <a:ln>
+            <a:noFill/>
+          </a:ln>
+        </p:spPr>
+        <p:style>
+          <a:lnRef idx="0"/>
+          <a:fillRef idx="0"/>
+          <a:effectRef idx="0"/>
+          <a:fontRef idx="minor"/>
+        </p:style>
+        <p:txBody>
+          <a:bodyPr lIns="90000" rIns="90000" tIns="45000" bIns="45000"/>
+          <a:p>
+            <a:pPr>
+              <a:lnSpc>
+                <a:spcPct val="100000"/>
+              </a:lnSpc>
+            </a:pPr>
+            <a:r>
+              <a:rPr b="0" lang="en-US" sz="1400" spc="-1" strike="noStrike">
+                <a:solidFill>
+                  <a:srgbClr val="000000"/>
+                </a:solidFill>
+                <a:latin typeface="Arial"/>
+                <a:ea typeface="DejaVu Sans"/>
+              </a:rPr>
+              <a:t>BonadroneMultishot</a:t>
+            </a:r>
+            <a:endParaRPr b="0" lang="en-US" sz="1400" spc="-1" strike="noStrike">
+              <a:latin typeface="Arial"/>
+            </a:endParaRPr>
+          </a:p>
+        </p:txBody>
+      </p:sp>
+      <p:sp>
+        <p:nvSpPr>
+          <p:cNvPr id="60" name="CustomShape 23"/>
+          <p:cNvSpPr/>
+          <p:nvPr/>
+        </p:nvSpPr>
+        <p:spPr>
+          <a:xfrm>
+            <a:off x="6176880" y="5114880"/>
+            <a:ext cx="1103760" cy="314640"/>
+          </a:xfrm>
+          <a:prstGeom prst="rect">
+            <a:avLst/>
+          </a:prstGeom>
+          <a:noFill/>
+          <a:ln>
+            <a:noFill/>
+          </a:ln>
+        </p:spPr>
+        <p:style>
+          <a:lnRef idx="0"/>
+          <a:fillRef idx="0"/>
+          <a:effectRef idx="0"/>
+          <a:fontRef idx="minor"/>
+        </p:style>
+        <p:txBody>
+          <a:bodyPr lIns="90000" rIns="90000" tIns="45000" bIns="45000"/>
+          <a:p>
+            <a:pPr>
+              <a:lnSpc>
+                <a:spcPct val="100000"/>
+              </a:lnSpc>
+            </a:pPr>
+            <a:r>
+              <a:rPr b="0" lang="en-US" sz="1400" spc="-1" strike="noStrike">
+                <a:solidFill>
+                  <a:srgbClr val="000000"/>
+                </a:solidFill>
+                <a:latin typeface="Arial"/>
+                <a:ea typeface="DejaVu Sans"/>
+              </a:rPr>
+              <a:t>BonadroneBrushed</a:t>
+            </a:r>
+            <a:endParaRPr b="0" lang="en-US" sz="1400" spc="-1" strike="noStrike">
+              <a:latin typeface="Arial"/>
+            </a:endParaRPr>
+          </a:p>
+        </p:txBody>
+      </p:sp>
+      <p:cxnSp>
+        <p:nvCxnSpPr>
+          <p:cNvPr id="61" name="Line 24"/>
+          <p:cNvCxnSpPr>
+            <a:endCxn id="59" idx="0"/>
+          </p:cNvCxnSpPr>
+          <p:nvPr/>
+        </p:nvCxnSpPr>
+        <p:spPr>
+          <a:xfrm>
+            <a:off x="5666040" y="4663440"/>
+            <a:ext cx="19080" cy="451800"/>
+          </a:xfrm>
+          <a:prstGeom prst="straightConnector1">
+            <a:avLst/>
+          </a:prstGeom>
+          <a:ln>
+            <a:solidFill>
+              <a:srgbClr val="000000"/>
+            </a:solidFill>
+          </a:ln>
+        </p:spPr>
+      </p:cxnSp>
+      <p:cxnSp>
+        <p:nvCxnSpPr>
+          <p:cNvPr id="62" name="Line 25"/>
+          <p:cNvCxnSpPr>
+            <a:endCxn id="60" idx="0"/>
+          </p:cNvCxnSpPr>
+          <p:nvPr/>
+        </p:nvCxnSpPr>
+        <p:spPr>
+          <a:xfrm>
+            <a:off x="5666040" y="4663440"/>
+            <a:ext cx="1063080" cy="451800"/>
           </a:xfrm>
           <a:prstGeom prst="straightConnector1">
             <a:avLst/>

</xml_diff>

<commit_message>
More Board subclass refactoring
</commit_message>
<xml_diff>
--- a/extras/media/boards.pptx
+++ b/extras/media/boards.pptx
@@ -1816,56 +1816,7 @@
         </p:nvSpPr>
         <p:spPr>
           <a:xfrm>
-            <a:off x="274320" y="3566160"/>
-            <a:ext cx="1554480" cy="314640"/>
-          </a:xfrm>
-          <a:prstGeom prst="rect">
-            <a:avLst/>
-          </a:prstGeom>
-          <a:noFill/>
-          <a:ln>
-            <a:noFill/>
-          </a:ln>
-        </p:spPr>
-        <p:style>
-          <a:lnRef idx="0"/>
-          <a:fillRef idx="0"/>
-          <a:effectRef idx="0"/>
-          <a:fontRef idx="minor"/>
-        </p:style>
-        <p:txBody>
-          <a:bodyPr lIns="90000" rIns="90000" tIns="45000" bIns="45000"/>
-          <a:p>
-            <a:pPr>
-              <a:lnSpc>
-                <a:spcPct val="100000"/>
-              </a:lnSpc>
-            </a:pPr>
-            <a:r>
-              <a:rPr b="0" lang="en-US" sz="1400" spc="-1" strike="noStrike">
-                <a:solidFill>
-                  <a:srgbClr val="000000"/>
-                </a:solidFill>
-                <a:latin typeface="Arial"/>
-                <a:ea typeface="DejaVu Sans"/>
-              </a:rPr>
-              <a:t>SentralBoard</a:t>
-            </a:r>
-            <a:endParaRPr b="0" lang="en-US" sz="1400" spc="-1" strike="noStrike">
-              <a:latin typeface="Arial"/>
-            </a:endParaRPr>
-          </a:p>
-        </p:txBody>
-      </p:sp>
-      <p:sp>
-        <p:nvSpPr>
-          <p:cNvPr id="43" name="CustomShape 6"/>
-          <p:cNvSpPr/>
-          <p:nvPr/>
-        </p:nvSpPr>
-        <p:spPr>
-          <a:xfrm>
-            <a:off x="4937760" y="3617280"/>
+            <a:off x="5760720" y="3617280"/>
             <a:ext cx="2286000" cy="314640"/>
           </a:xfrm>
           <a:prstGeom prst="rect">
@@ -1928,7 +1879,7 @@
       </p:sp>
       <p:cxnSp>
         <p:nvCxnSpPr>
-          <p:cNvPr id="44" name="Line 7"/>
+          <p:cNvPr id="43" name="Line 6"/>
           <p:cNvCxnSpPr>
             <a:stCxn id="38" idx="2"/>
             <a:endCxn id="39" idx="0"/>
@@ -1952,7 +1903,7 @@
       </p:cxnSp>
       <p:cxnSp>
         <p:nvCxnSpPr>
-          <p:cNvPr id="45" name="Line 8"/>
+          <p:cNvPr id="44" name="Line 7"/>
           <p:cNvCxnSpPr>
             <a:stCxn id="40" idx="0"/>
             <a:endCxn id="39" idx="2"/>
@@ -1976,16 +1927,16 @@
       </p:cxnSp>
       <p:cxnSp>
         <p:nvCxnSpPr>
-          <p:cNvPr id="46" name="Line 9"/>
+          <p:cNvPr id="45" name="Line 8"/>
           <p:cNvCxnSpPr>
-            <a:endCxn id="41" idx="1"/>
+            <a:endCxn id="41" idx="0"/>
           </p:cNvCxnSpPr>
           <p:nvPr/>
         </p:nvCxnSpPr>
         <p:spPr>
           <a:xfrm>
             <a:off x="5755680" y="1960920"/>
-            <a:ext cx="2098440" cy="1122840"/>
+            <a:ext cx="2835000" cy="965520"/>
           </a:xfrm>
           <a:prstGeom prst="straightConnector1">
             <a:avLst/>
@@ -1999,14 +1950,14 @@
       </p:cxnSp>
       <p:sp>
         <p:nvSpPr>
-          <p:cNvPr id="47" name="CustomShape 10"/>
+          <p:cNvPr id="46" name="CustomShape 9"/>
           <p:cNvSpPr/>
           <p:nvPr/>
         </p:nvSpPr>
         <p:spPr>
           <a:xfrm>
-            <a:off x="1625760" y="4374000"/>
-            <a:ext cx="1940400" cy="314640"/>
+            <a:off x="1168560" y="4374000"/>
+            <a:ext cx="1300320" cy="314640"/>
           </a:xfrm>
           <a:prstGeom prst="rect">
             <a:avLst/>
@@ -2038,7 +1989,7 @@
                 <a:latin typeface="Arial"/>
                 <a:ea typeface="DejaVu Sans"/>
               </a:rPr>
-              <a:t>Arduin</a:t>
+              <a:t>Sentra</a:t>
             </a:r>
             <a:r>
               <a:rPr b="0" lang="en-US" sz="1400" spc="-1" strike="noStrike">
@@ -2048,27 +1999,7 @@
                 <a:latin typeface="Arial"/>
                 <a:ea typeface="DejaVu Sans"/>
               </a:rPr>
-              <a:t>oSentr</a:t>
-            </a:r>
-            <a:r>
-              <a:rPr b="0" lang="en-US" sz="1400" spc="-1" strike="noStrike">
-                <a:solidFill>
-                  <a:srgbClr val="000000"/>
-                </a:solidFill>
-                <a:latin typeface="Arial"/>
-                <a:ea typeface="DejaVu Sans"/>
-              </a:rPr>
-              <a:t>alBoar</a:t>
-            </a:r>
-            <a:r>
-              <a:rPr b="0" lang="en-US" sz="1400" spc="-1" strike="noStrike">
-                <a:solidFill>
-                  <a:srgbClr val="000000"/>
-                </a:solidFill>
-                <a:latin typeface="Arial"/>
-                <a:ea typeface="DejaVu Sans"/>
-              </a:rPr>
-              <a:t>d</a:t>
+              <a:t>lBoard</a:t>
             </a:r>
             <a:endParaRPr b="0" lang="en-US" sz="1400" spc="-1" strike="noStrike">
               <a:latin typeface="Arial"/>
@@ -2078,17 +2009,17 @@
       </p:sp>
       <p:cxnSp>
         <p:nvCxnSpPr>
-          <p:cNvPr id="48" name="Line 11"/>
+          <p:cNvPr id="47" name="Line 10"/>
           <p:cNvCxnSpPr>
             <a:stCxn id="40" idx="2"/>
-            <a:endCxn id="47" idx="0"/>
+            <a:endCxn id="46" idx="0"/>
           </p:cNvCxnSpPr>
           <p:nvPr/>
         </p:nvCxnSpPr>
         <p:spPr>
           <a:xfrm flipH="1">
-            <a:off x="2595960" y="3972240"/>
-            <a:ext cx="798840" cy="402120"/>
+            <a:off x="1818720" y="3972240"/>
+            <a:ext cx="1576080" cy="402120"/>
           </a:xfrm>
           <a:prstGeom prst="straightConnector1">
             <a:avLst/>
@@ -2100,39 +2031,15 @@
           </a:ln>
         </p:spPr>
       </p:cxnSp>
-      <p:cxnSp>
-        <p:nvCxnSpPr>
-          <p:cNvPr id="49" name="Line 12"/>
-          <p:cNvCxnSpPr>
-            <a:stCxn id="47" idx="0"/>
-            <a:endCxn id="42" idx="2"/>
-          </p:cNvCxnSpPr>
-          <p:nvPr/>
-        </p:nvCxnSpPr>
-        <p:spPr>
-          <a:xfrm flipH="1" flipV="1">
-            <a:off x="1051560" y="3880800"/>
-            <a:ext cx="1544760" cy="493560"/>
-          </a:xfrm>
-          <a:prstGeom prst="straightConnector1">
-            <a:avLst/>
-          </a:prstGeom>
-          <a:ln>
-            <a:solidFill>
-              <a:srgbClr val="000000"/>
-            </a:solidFill>
-          </a:ln>
-        </p:spPr>
-      </p:cxnSp>
-      <p:sp>
-        <p:nvSpPr>
-          <p:cNvPr id="50" name="CustomShape 13"/>
+      <p:sp>
+        <p:nvSpPr>
+          <p:cNvPr id="48" name="CustomShape 11"/>
           <p:cNvSpPr/>
           <p:nvPr/>
         </p:nvSpPr>
         <p:spPr>
           <a:xfrm>
-            <a:off x="753840" y="5120640"/>
+            <a:off x="285840" y="5120640"/>
             <a:ext cx="892080" cy="314640"/>
           </a:xfrm>
           <a:prstGeom prst="rect">
@@ -2175,13 +2082,13 @@
       </p:sp>
       <p:sp>
         <p:nvSpPr>
-          <p:cNvPr id="51" name="CustomShape 14"/>
+          <p:cNvPr id="49" name="CustomShape 12"/>
           <p:cNvSpPr/>
           <p:nvPr/>
         </p:nvSpPr>
         <p:spPr>
           <a:xfrm>
-            <a:off x="2595960" y="5120640"/>
+            <a:off x="1947960" y="5120640"/>
             <a:ext cx="1103760" cy="314640"/>
           </a:xfrm>
           <a:prstGeom prst="rect">
@@ -2224,16 +2131,17 @@
       </p:sp>
       <p:cxnSp>
         <p:nvCxnSpPr>
-          <p:cNvPr id="52" name="Line 15"/>
+          <p:cNvPr id="50" name="Line 13"/>
           <p:cNvCxnSpPr>
-            <a:endCxn id="50" idx="0"/>
+            <a:stCxn id="46" idx="2"/>
+            <a:endCxn id="48" idx="0"/>
           </p:cNvCxnSpPr>
           <p:nvPr/>
         </p:nvCxnSpPr>
         <p:spPr>
           <a:xfrm flipH="1">
-            <a:off x="1199880" y="4688640"/>
-            <a:ext cx="1396440" cy="432360"/>
+            <a:off x="731880" y="4688640"/>
+            <a:ext cx="1087200" cy="432360"/>
           </a:xfrm>
           <a:prstGeom prst="straightConnector1">
             <a:avLst/>
@@ -2247,16 +2155,17 @@
       </p:cxnSp>
       <p:cxnSp>
         <p:nvCxnSpPr>
-          <p:cNvPr id="53" name="Line 16"/>
+          <p:cNvPr id="51" name="Line 14"/>
           <p:cNvCxnSpPr>
-            <a:endCxn id="51" idx="0"/>
+            <a:stCxn id="46" idx="2"/>
+            <a:endCxn id="49" idx="0"/>
           </p:cNvCxnSpPr>
           <p:nvPr/>
         </p:nvCxnSpPr>
         <p:spPr>
           <a:xfrm>
-            <a:off x="2595960" y="4688640"/>
-            <a:ext cx="552240" cy="432360"/>
+            <a:off x="1818720" y="4688640"/>
+            <a:ext cx="681480" cy="432360"/>
           </a:xfrm>
           <a:prstGeom prst="straightConnector1">
             <a:avLst/>
@@ -2270,14 +2179,14 @@
       </p:cxnSp>
       <p:sp>
         <p:nvSpPr>
-          <p:cNvPr id="54" name="CustomShape 17"/>
+          <p:cNvPr id="52" name="CustomShape 15"/>
           <p:cNvSpPr/>
           <p:nvPr/>
         </p:nvSpPr>
         <p:spPr>
           <a:xfrm>
-            <a:off x="5114160" y="4348800"/>
-            <a:ext cx="1103760" cy="314640"/>
+            <a:off x="5852160" y="4348800"/>
+            <a:ext cx="1554480" cy="314640"/>
           </a:xfrm>
           <a:prstGeom prst="rect">
             <a:avLst/>
@@ -2309,7 +2218,7 @@
                 <a:latin typeface="Arial"/>
                 <a:ea typeface="DejaVu Sans"/>
               </a:rPr>
-              <a:t>Bonadrone</a:t>
+              <a:t>BonadroneBoard</a:t>
             </a:r>
             <a:endParaRPr b="0" lang="en-US" sz="1400" spc="-1" strike="noStrike">
               <a:latin typeface="Arial"/>
@@ -2319,16 +2228,16 @@
       </p:sp>
       <p:cxnSp>
         <p:nvCxnSpPr>
-          <p:cNvPr id="55" name="Line 18"/>
+          <p:cNvPr id="53" name="Line 16"/>
           <p:cNvCxnSpPr>
-            <a:endCxn id="54" idx="0"/>
+            <a:endCxn id="52" idx="0"/>
           </p:cNvCxnSpPr>
           <p:nvPr/>
         </p:nvCxnSpPr>
         <p:spPr>
           <a:xfrm>
             <a:off x="3394440" y="3972240"/>
-            <a:ext cx="2271960" cy="376920"/>
+            <a:ext cx="3235320" cy="376920"/>
           </a:xfrm>
           <a:prstGeom prst="straightConnector1">
             <a:avLst/>
@@ -2342,17 +2251,17 @@
       </p:cxnSp>
       <p:cxnSp>
         <p:nvCxnSpPr>
-          <p:cNvPr id="56" name="Line 19"/>
+          <p:cNvPr id="54" name="Line 17"/>
           <p:cNvCxnSpPr>
-            <a:stCxn id="43" idx="2"/>
-            <a:endCxn id="54" idx="0"/>
+            <a:stCxn id="42" idx="2"/>
+            <a:endCxn id="52" idx="0"/>
           </p:cNvCxnSpPr>
           <p:nvPr/>
         </p:nvCxnSpPr>
         <p:spPr>
           <a:xfrm flipH="1">
-            <a:off x="5666040" y="3931920"/>
-            <a:ext cx="415080" cy="417240"/>
+            <a:off x="6629400" y="3931920"/>
+            <a:ext cx="274680" cy="417240"/>
           </a:xfrm>
           <a:prstGeom prst="straightConnector1">
             <a:avLst/>
@@ -2366,15 +2275,13 @@
       </p:cxnSp>
       <p:cxnSp>
         <p:nvCxnSpPr>
-          <p:cNvPr id="57" name="Line 20"/>
-          <p:cNvCxnSpPr>
-            <a:stCxn id="54" idx="2"/>
-          </p:cNvCxnSpPr>
+          <p:cNvPr id="55" name="Line 18"/>
+          <p:cNvCxnSpPr/>
           <p:nvPr/>
         </p:nvCxnSpPr>
         <p:spPr>
           <a:xfrm flipH="1">
-            <a:off x="4568760" y="4663440"/>
+            <a:off x="5306760" y="4663440"/>
             <a:ext cx="1097640" cy="457560"/>
           </a:xfrm>
           <a:prstGeom prst="straightConnector1">
@@ -2389,13 +2296,13 @@
       </p:cxnSp>
       <p:sp>
         <p:nvSpPr>
-          <p:cNvPr id="58" name="CustomShape 21"/>
+          <p:cNvPr id="56" name="CustomShape 19"/>
           <p:cNvSpPr/>
           <p:nvPr/>
         </p:nvSpPr>
         <p:spPr>
           <a:xfrm>
-            <a:off x="4016880" y="5120640"/>
+            <a:off x="4754880" y="5120640"/>
             <a:ext cx="1103760" cy="314640"/>
           </a:xfrm>
           <a:prstGeom prst="rect">
@@ -2438,13 +2345,13 @@
       </p:sp>
       <p:sp>
         <p:nvSpPr>
-          <p:cNvPr id="59" name="CustomShape 22"/>
+          <p:cNvPr id="57" name="CustomShape 20"/>
           <p:cNvSpPr/>
           <p:nvPr/>
         </p:nvSpPr>
         <p:spPr>
           <a:xfrm>
-            <a:off x="5132880" y="5114880"/>
+            <a:off x="5870880" y="5114880"/>
             <a:ext cx="1103760" cy="314640"/>
           </a:xfrm>
           <a:prstGeom prst="rect">
@@ -2487,13 +2394,13 @@
       </p:sp>
       <p:sp>
         <p:nvSpPr>
-          <p:cNvPr id="60" name="CustomShape 23"/>
+          <p:cNvPr id="58" name="CustomShape 21"/>
           <p:cNvSpPr/>
           <p:nvPr/>
         </p:nvSpPr>
         <p:spPr>
           <a:xfrm>
-            <a:off x="6176880" y="5114880"/>
+            <a:off x="6914880" y="5114880"/>
             <a:ext cx="1103760" cy="314640"/>
           </a:xfrm>
           <a:prstGeom prst="rect">
@@ -2536,15 +2443,15 @@
       </p:sp>
       <p:cxnSp>
         <p:nvCxnSpPr>
-          <p:cNvPr id="61" name="Line 24"/>
+          <p:cNvPr id="59" name="Line 22"/>
           <p:cNvCxnSpPr>
-            <a:endCxn id="59" idx="0"/>
+            <a:endCxn id="57" idx="0"/>
           </p:cNvCxnSpPr>
           <p:nvPr/>
         </p:nvCxnSpPr>
         <p:spPr>
           <a:xfrm>
-            <a:off x="5666040" y="4663440"/>
+            <a:off x="6404040" y="4663440"/>
             <a:ext cx="19080" cy="451800"/>
           </a:xfrm>
           <a:prstGeom prst="straightConnector1">
@@ -2559,16 +2466,234 @@
       </p:cxnSp>
       <p:cxnSp>
         <p:nvCxnSpPr>
-          <p:cNvPr id="62" name="Line 25"/>
+          <p:cNvPr id="60" name="Line 23"/>
           <p:cNvCxnSpPr>
-            <a:endCxn id="60" idx="0"/>
+            <a:endCxn id="58" idx="0"/>
           </p:cNvCxnSpPr>
           <p:nvPr/>
         </p:nvCxnSpPr>
         <p:spPr>
           <a:xfrm>
-            <a:off x="5666040" y="4663440"/>
+            <a:off x="6404040" y="4663440"/>
             <a:ext cx="1063080" cy="451800"/>
+          </a:xfrm>
+          <a:prstGeom prst="straightConnector1">
+            <a:avLst/>
+          </a:prstGeom>
+          <a:ln>
+            <a:solidFill>
+              <a:srgbClr val="000000"/>
+            </a:solidFill>
+          </a:ln>
+        </p:spPr>
+      </p:cxnSp>
+      <p:sp>
+        <p:nvSpPr>
+          <p:cNvPr id="61" name="CustomShape 24"/>
+          <p:cNvSpPr/>
+          <p:nvPr/>
+        </p:nvSpPr>
+        <p:spPr>
+          <a:xfrm>
+            <a:off x="3062160" y="4374000"/>
+            <a:ext cx="1440720" cy="314640"/>
+          </a:xfrm>
+          <a:prstGeom prst="rect">
+            <a:avLst/>
+          </a:prstGeom>
+          <a:noFill/>
+          <a:ln>
+            <a:noFill/>
+          </a:ln>
+        </p:spPr>
+        <p:style>
+          <a:lnRef idx="0"/>
+          <a:fillRef idx="0"/>
+          <a:effectRef idx="0"/>
+          <a:fontRef idx="minor"/>
+        </p:style>
+        <p:txBody>
+          <a:bodyPr lIns="90000" rIns="90000" tIns="45000" bIns="45000"/>
+          <a:p>
+            <a:pPr>
+              <a:lnSpc>
+                <a:spcPct val="100000"/>
+              </a:lnSpc>
+            </a:pPr>
+            <a:r>
+              <a:rPr b="0" lang="en-US" sz="1400" spc="-1" strike="noStrike">
+                <a:solidFill>
+                  <a:srgbClr val="000000"/>
+                </a:solidFill>
+                <a:latin typeface="Arial"/>
+                <a:ea typeface="DejaVu Sans"/>
+              </a:rPr>
+              <a:t>MockBoard</a:t>
+            </a:r>
+            <a:endParaRPr b="0" lang="en-US" sz="1400" spc="-1" strike="noStrike">
+              <a:latin typeface="Arial"/>
+            </a:endParaRPr>
+          </a:p>
+        </p:txBody>
+      </p:sp>
+      <p:cxnSp>
+        <p:nvCxnSpPr>
+          <p:cNvPr id="62" name="Line 25"/>
+          <p:cNvCxnSpPr>
+            <a:endCxn id="61" idx="0"/>
+          </p:cNvCxnSpPr>
+          <p:nvPr/>
+        </p:nvCxnSpPr>
+        <p:spPr>
+          <a:xfrm>
+            <a:off x="3394440" y="3972240"/>
+            <a:ext cx="388440" cy="402120"/>
+          </a:xfrm>
+          <a:prstGeom prst="straightConnector1">
+            <a:avLst/>
+          </a:prstGeom>
+          <a:ln>
+            <a:solidFill>
+              <a:srgbClr val="000000"/>
+            </a:solidFill>
+          </a:ln>
+        </p:spPr>
+      </p:cxnSp>
+      <p:sp>
+        <p:nvSpPr>
+          <p:cNvPr id="63" name="CustomShape 26"/>
+          <p:cNvSpPr/>
+          <p:nvPr/>
+        </p:nvSpPr>
+        <p:spPr>
+          <a:xfrm>
+            <a:off x="2847960" y="5120640"/>
+            <a:ext cx="1103760" cy="314640"/>
+          </a:xfrm>
+          <a:prstGeom prst="rect">
+            <a:avLst/>
+          </a:prstGeom>
+          <a:noFill/>
+          <a:ln>
+            <a:noFill/>
+          </a:ln>
+        </p:spPr>
+        <p:style>
+          <a:lnRef idx="0"/>
+          <a:fillRef idx="0"/>
+          <a:effectRef idx="0"/>
+          <a:fontRef idx="minor"/>
+        </p:style>
+        <p:txBody>
+          <a:bodyPr lIns="90000" rIns="90000" tIns="45000" bIns="45000"/>
+          <a:p>
+            <a:pPr>
+              <a:lnSpc>
+                <a:spcPct val="100000"/>
+              </a:lnSpc>
+            </a:pPr>
+            <a:r>
+              <a:rPr b="0" lang="en-US" sz="1400" spc="-1" strike="noStrike">
+                <a:solidFill>
+                  <a:srgbClr val="000000"/>
+                </a:solidFill>
+                <a:latin typeface="Arial"/>
+                <a:ea typeface="DejaVu Sans"/>
+              </a:rPr>
+              <a:t>Dragonfly</a:t>
+            </a:r>
+            <a:endParaRPr b="0" lang="en-US" sz="1400" spc="-1" strike="noStrike">
+              <a:latin typeface="Arial"/>
+            </a:endParaRPr>
+          </a:p>
+        </p:txBody>
+      </p:sp>
+      <p:cxnSp>
+        <p:nvCxnSpPr>
+          <p:cNvPr id="64" name="Line 27"/>
+          <p:cNvCxnSpPr>
+            <a:stCxn id="61" idx="2"/>
+            <a:endCxn id="63" idx="0"/>
+          </p:cNvCxnSpPr>
+          <p:nvPr/>
+        </p:nvCxnSpPr>
+        <p:spPr>
+          <a:xfrm flipH="1">
+            <a:off x="3399840" y="4688640"/>
+            <a:ext cx="383040" cy="432360"/>
+          </a:xfrm>
+          <a:prstGeom prst="straightConnector1">
+            <a:avLst/>
+          </a:prstGeom>
+          <a:ln>
+            <a:solidFill>
+              <a:srgbClr val="000000"/>
+            </a:solidFill>
+          </a:ln>
+        </p:spPr>
+      </p:cxnSp>
+      <p:sp>
+        <p:nvSpPr>
+          <p:cNvPr id="65" name="CustomShape 28"/>
+          <p:cNvSpPr/>
+          <p:nvPr/>
+        </p:nvSpPr>
+        <p:spPr>
+          <a:xfrm>
+            <a:off x="3747960" y="5120640"/>
+            <a:ext cx="1103760" cy="314640"/>
+          </a:xfrm>
+          <a:prstGeom prst="rect">
+            <a:avLst/>
+          </a:prstGeom>
+          <a:noFill/>
+          <a:ln>
+            <a:noFill/>
+          </a:ln>
+        </p:spPr>
+        <p:style>
+          <a:lnRef idx="0"/>
+          <a:fillRef idx="0"/>
+          <a:effectRef idx="0"/>
+          <a:fontRef idx="minor"/>
+        </p:style>
+        <p:txBody>
+          <a:bodyPr lIns="90000" rIns="90000" tIns="45000" bIns="45000"/>
+          <a:p>
+            <a:pPr>
+              <a:lnSpc>
+                <a:spcPct val="100000"/>
+              </a:lnSpc>
+            </a:pPr>
+            <a:r>
+              <a:rPr b="0" lang="en-US" sz="1400" spc="-1" strike="noStrike">
+                <a:solidFill>
+                  <a:srgbClr val="000000"/>
+                </a:solidFill>
+                <a:latin typeface="Arial"/>
+                <a:ea typeface="DejaVu Sans"/>
+              </a:rPr>
+              <a:t>ThingDev</a:t>
+            </a:r>
+            <a:endParaRPr b="0" lang="en-US" sz="1400" spc="-1" strike="noStrike">
+              <a:latin typeface="Arial"/>
+            </a:endParaRPr>
+          </a:p>
+        </p:txBody>
+      </p:sp>
+      <p:cxnSp>
+        <p:nvCxnSpPr>
+          <p:cNvPr id="66" name="Line 29"/>
+          <p:cNvCxnSpPr>
+            <a:stCxn id="61" idx="2"/>
+            <a:endCxn id="65" idx="0"/>
+          </p:cNvCxnSpPr>
+          <p:nvPr/>
+        </p:nvCxnSpPr>
+        <p:spPr>
+          <a:xfrm>
+            <a:off x="3782520" y="4688640"/>
+            <a:ext cx="517680" cy="432360"/>
           </a:xfrm>
           <a:prstGeom prst="straightConnector1">
             <a:avLst/>

</xml_diff>

<commit_message>
Begin factoring to Stm32FBoard class
</commit_message>
<xml_diff>
--- a/extras/media/boards.pptx
+++ b/extras/media/boards.pptx
@@ -1620,7 +1620,7 @@
         </p:nvSpPr>
         <p:spPr>
           <a:xfrm>
-            <a:off x="5293440" y="1645920"/>
+            <a:off x="5120640" y="365760"/>
             <a:ext cx="924480" cy="314640"/>
           </a:xfrm>
           <a:prstGeom prst="rect">
@@ -1669,7 +1669,7 @@
         </p:nvSpPr>
         <p:spPr>
           <a:xfrm>
-            <a:off x="3224160" y="2917080"/>
+            <a:off x="3008160" y="1513080"/>
             <a:ext cx="1097280" cy="314640"/>
           </a:xfrm>
           <a:prstGeom prst="rect">
@@ -1718,7 +1718,7 @@
         </p:nvSpPr>
         <p:spPr>
           <a:xfrm>
-            <a:off x="2674080" y="3657600"/>
+            <a:off x="2458080" y="2937600"/>
             <a:ext cx="1440720" cy="314640"/>
           </a:xfrm>
           <a:prstGeom prst="rect">
@@ -1767,7 +1767,7 @@
         </p:nvSpPr>
         <p:spPr>
           <a:xfrm>
-            <a:off x="7853760" y="2926080"/>
+            <a:off x="7637760" y="1558080"/>
             <a:ext cx="1473120" cy="314640"/>
           </a:xfrm>
           <a:prstGeom prst="rect">
@@ -1816,7 +1816,7 @@
         </p:nvSpPr>
         <p:spPr>
           <a:xfrm>
-            <a:off x="5760720" y="3617280"/>
+            <a:off x="4297680" y="2937600"/>
             <a:ext cx="2286000" cy="314640"/>
           </a:xfrm>
           <a:prstGeom prst="rect">
@@ -1888,8 +1888,8 @@
         </p:nvCxnSpPr>
         <p:spPr>
           <a:xfrm flipH="1">
-            <a:off x="3772800" y="1960560"/>
-            <a:ext cx="1983240" cy="956880"/>
+            <a:off x="3556800" y="680400"/>
+            <a:ext cx="2026440" cy="833040"/>
           </a:xfrm>
           <a:prstGeom prst="straightConnector1">
             <a:avLst/>
@@ -1912,8 +1912,8 @@
         </p:nvCxnSpPr>
         <p:spPr>
           <a:xfrm flipV="1">
-            <a:off x="3394440" y="3231720"/>
-            <a:ext cx="378720" cy="426240"/>
+            <a:off x="3178440" y="1827720"/>
+            <a:ext cx="378720" cy="1110240"/>
           </a:xfrm>
           <a:prstGeom prst="straightConnector1">
             <a:avLst/>
@@ -1929,14 +1929,15 @@
         <p:nvCxnSpPr>
           <p:cNvPr id="45" name="Line 8"/>
           <p:cNvCxnSpPr>
+            <a:stCxn id="38" idx="2"/>
             <a:endCxn id="41" idx="0"/>
           </p:cNvCxnSpPr>
           <p:nvPr/>
         </p:nvCxnSpPr>
         <p:spPr>
           <a:xfrm>
-            <a:off x="5755680" y="1960920"/>
-            <a:ext cx="2835000" cy="965520"/>
+            <a:off x="5582880" y="680400"/>
+            <a:ext cx="2791800" cy="878040"/>
           </a:xfrm>
           <a:prstGeom prst="straightConnector1">
             <a:avLst/>
@@ -1956,7 +1957,7 @@
         </p:nvSpPr>
         <p:spPr>
           <a:xfrm>
-            <a:off x="1168560" y="4374000"/>
+            <a:off x="403920" y="3654000"/>
             <a:ext cx="1300320" cy="314640"/>
           </a:xfrm>
           <a:prstGeom prst="rect">
@@ -2018,8 +2019,8 @@
         </p:nvCxnSpPr>
         <p:spPr>
           <a:xfrm flipH="1">
-            <a:off x="1818720" y="3972240"/>
-            <a:ext cx="1576080" cy="402120"/>
+            <a:off x="1054080" y="3252240"/>
+            <a:ext cx="2124720" cy="402120"/>
           </a:xfrm>
           <a:prstGeom prst="straightConnector1">
             <a:avLst/>
@@ -2039,7 +2040,7 @@
         </p:nvSpPr>
         <p:spPr>
           <a:xfrm>
-            <a:off x="285840" y="5120640"/>
+            <a:off x="69840" y="4400640"/>
             <a:ext cx="892080" cy="314640"/>
           </a:xfrm>
           <a:prstGeom prst="rect">
@@ -2088,7 +2089,7 @@
         </p:nvSpPr>
         <p:spPr>
           <a:xfrm>
-            <a:off x="1947960" y="5120640"/>
+            <a:off x="1064160" y="4400640"/>
             <a:ext cx="1103760" cy="314640"/>
           </a:xfrm>
           <a:prstGeom prst="rect">
@@ -2140,8 +2141,8 @@
         </p:nvCxnSpPr>
         <p:spPr>
           <a:xfrm flipH="1">
-            <a:off x="731880" y="4688640"/>
-            <a:ext cx="1087200" cy="432360"/>
+            <a:off x="515880" y="3968640"/>
+            <a:ext cx="538560" cy="432360"/>
           </a:xfrm>
           <a:prstGeom prst="straightConnector1">
             <a:avLst/>
@@ -2164,8 +2165,8 @@
         </p:nvCxnSpPr>
         <p:spPr>
           <a:xfrm>
-            <a:off x="1818720" y="4688640"/>
-            <a:ext cx="681480" cy="432360"/>
+            <a:off x="1054080" y="3968640"/>
+            <a:ext cx="562320" cy="432360"/>
           </a:xfrm>
           <a:prstGeom prst="straightConnector1">
             <a:avLst/>
@@ -2185,7 +2186,7 @@
         </p:nvSpPr>
         <p:spPr>
           <a:xfrm>
-            <a:off x="5852160" y="4348800"/>
+            <a:off x="4081680" y="3628800"/>
             <a:ext cx="1554480" cy="314640"/>
           </a:xfrm>
           <a:prstGeom prst="rect">
@@ -2236,8 +2237,8 @@
         </p:nvCxnSpPr>
         <p:spPr>
           <a:xfrm>
-            <a:off x="3394440" y="3972240"/>
-            <a:ext cx="3235320" cy="376920"/>
+            <a:off x="3178440" y="3252240"/>
+            <a:ext cx="1680840" cy="376920"/>
           </a:xfrm>
           <a:prstGeom prst="straightConnector1">
             <a:avLst/>
@@ -2260,8 +2261,8 @@
         </p:nvCxnSpPr>
         <p:spPr>
           <a:xfrm flipH="1">
-            <a:off x="6629400" y="3931920"/>
-            <a:ext cx="274680" cy="417240"/>
+            <a:off x="4858920" y="3252240"/>
+            <a:ext cx="582120" cy="376920"/>
           </a:xfrm>
           <a:prstGeom prst="straightConnector1">
             <a:avLst/>
@@ -2276,13 +2277,15 @@
       <p:cxnSp>
         <p:nvCxnSpPr>
           <p:cNvPr id="55" name="Line 18"/>
-          <p:cNvCxnSpPr/>
+          <p:cNvCxnSpPr>
+            <a:stCxn id="52" idx="2"/>
+          </p:cNvCxnSpPr>
           <p:nvPr/>
         </p:nvCxnSpPr>
         <p:spPr>
           <a:xfrm flipH="1">
-            <a:off x="5306760" y="4663440"/>
-            <a:ext cx="1097640" cy="457560"/>
+            <a:off x="4478760" y="3943440"/>
+            <a:ext cx="380520" cy="457560"/>
           </a:xfrm>
           <a:prstGeom prst="straightConnector1">
             <a:avLst/>
@@ -2302,7 +2305,7 @@
         </p:nvSpPr>
         <p:spPr>
           <a:xfrm>
-            <a:off x="4754880" y="5120640"/>
+            <a:off x="3926880" y="4400640"/>
             <a:ext cx="1103760" cy="314640"/>
           </a:xfrm>
           <a:prstGeom prst="rect">
@@ -2351,7 +2354,7 @@
         </p:nvSpPr>
         <p:spPr>
           <a:xfrm>
-            <a:off x="5870880" y="5114880"/>
+            <a:off x="5078880" y="4394880"/>
             <a:ext cx="1103760" cy="314640"/>
           </a:xfrm>
           <a:prstGeom prst="rect">
@@ -2400,7 +2403,7 @@
         </p:nvSpPr>
         <p:spPr>
           <a:xfrm>
-            <a:off x="6914880" y="5114880"/>
+            <a:off x="6194880" y="4394880"/>
             <a:ext cx="1103760" cy="314640"/>
           </a:xfrm>
           <a:prstGeom prst="rect">
@@ -2445,14 +2448,15 @@
         <p:nvCxnSpPr>
           <p:cNvPr id="59" name="Line 22"/>
           <p:cNvCxnSpPr>
+            <a:stCxn id="52" idx="2"/>
             <a:endCxn id="57" idx="0"/>
           </p:cNvCxnSpPr>
           <p:nvPr/>
         </p:nvCxnSpPr>
         <p:spPr>
           <a:xfrm>
-            <a:off x="6404040" y="4663440"/>
-            <a:ext cx="19080" cy="451800"/>
+            <a:off x="4858920" y="3943440"/>
+            <a:ext cx="772200" cy="451800"/>
           </a:xfrm>
           <a:prstGeom prst="straightConnector1">
             <a:avLst/>
@@ -2468,14 +2472,15 @@
         <p:nvCxnSpPr>
           <p:cNvPr id="60" name="Line 23"/>
           <p:cNvCxnSpPr>
+            <a:stCxn id="52" idx="2"/>
             <a:endCxn id="58" idx="0"/>
           </p:cNvCxnSpPr>
           <p:nvPr/>
         </p:nvCxnSpPr>
         <p:spPr>
           <a:xfrm>
-            <a:off x="6404040" y="4663440"/>
-            <a:ext cx="1063080" cy="451800"/>
+            <a:off x="4858920" y="3943440"/>
+            <a:ext cx="1888200" cy="451800"/>
           </a:xfrm>
           <a:prstGeom prst="straightConnector1">
             <a:avLst/>
@@ -2495,7 +2500,7 @@
         </p:nvSpPr>
         <p:spPr>
           <a:xfrm>
-            <a:off x="3062160" y="4374000"/>
+            <a:off x="2344320" y="3628800"/>
             <a:ext cx="1440720" cy="314640"/>
           </a:xfrm>
           <a:prstGeom prst="rect">
@@ -2545,9 +2550,9 @@
           <p:nvPr/>
         </p:nvCxnSpPr>
         <p:spPr>
-          <a:xfrm>
-            <a:off x="3394440" y="3972240"/>
-            <a:ext cx="388440" cy="402120"/>
+          <a:xfrm flipH="1">
+            <a:off x="3064680" y="3252240"/>
+            <a:ext cx="114120" cy="376920"/>
           </a:xfrm>
           <a:prstGeom prst="straightConnector1">
             <a:avLst/>
@@ -2567,7 +2572,7 @@
         </p:nvSpPr>
         <p:spPr>
           <a:xfrm>
-            <a:off x="2847960" y="5120640"/>
+            <a:off x="1972080" y="4400640"/>
             <a:ext cx="1103760" cy="314640"/>
           </a:xfrm>
           <a:prstGeom prst="rect">
@@ -2619,8 +2624,8 @@
         </p:nvCxnSpPr>
         <p:spPr>
           <a:xfrm flipH="1">
-            <a:off x="3399840" y="4688640"/>
-            <a:ext cx="383040" cy="432360"/>
+            <a:off x="2523960" y="3943440"/>
+            <a:ext cx="541080" cy="457560"/>
           </a:xfrm>
           <a:prstGeom prst="straightConnector1">
             <a:avLst/>
@@ -2640,7 +2645,7 @@
         </p:nvSpPr>
         <p:spPr>
           <a:xfrm>
-            <a:off x="3747960" y="5120640"/>
+            <a:off x="2977920" y="4400640"/>
             <a:ext cx="1103760" cy="314640"/>
           </a:xfrm>
           <a:prstGeom prst="rect">
@@ -2692,8 +2697,8 @@
         </p:nvCxnSpPr>
         <p:spPr>
           <a:xfrm>
-            <a:off x="3782520" y="4688640"/>
-            <a:ext cx="517680" cy="432360"/>
+            <a:off x="3064680" y="3943440"/>
+            <a:ext cx="465480" cy="457560"/>
           </a:xfrm>
           <a:prstGeom prst="straightConnector1">
             <a:avLst/>

</xml_diff>

<commit_message>
+More Board class documentation
</commit_message>
<xml_diff>
--- a/extras/media/boards.pptx
+++ b/extras/media/boards.pptx
@@ -53,7 +53,7 @@
       </p:grpSpPr>
       <p:sp>
         <p:nvSpPr>
-          <p:cNvPr id="23" name="PlaceHolder 1"/>
+          <p:cNvPr id="21" name="PlaceHolder 1"/>
           <p:cNvSpPr>
             <a:spLocks noGrp="1"/>
           </p:cNvSpPr>
@@ -82,7 +82,7 @@
       </p:sp>
       <p:sp>
         <p:nvSpPr>
-          <p:cNvPr id="24" name="PlaceHolder 2"/>
+          <p:cNvPr id="22" name="PlaceHolder 2"/>
           <p:cNvSpPr>
             <a:spLocks noGrp="1"/>
           </p:cNvSpPr>
@@ -112,7 +112,7 @@
       </p:sp>
       <p:sp>
         <p:nvSpPr>
-          <p:cNvPr id="25" name="PlaceHolder 3"/>
+          <p:cNvPr id="23" name="PlaceHolder 3"/>
           <p:cNvSpPr>
             <a:spLocks noGrp="1"/>
           </p:cNvSpPr>
@@ -164,7 +164,7 @@
       </p:grpSpPr>
       <p:sp>
         <p:nvSpPr>
-          <p:cNvPr id="26" name="PlaceHolder 1"/>
+          <p:cNvPr id="24" name="PlaceHolder 1"/>
           <p:cNvSpPr>
             <a:spLocks noGrp="1"/>
           </p:cNvSpPr>
@@ -193,7 +193,7 @@
       </p:sp>
       <p:sp>
         <p:nvSpPr>
-          <p:cNvPr id="27" name="PlaceHolder 2"/>
+          <p:cNvPr id="25" name="PlaceHolder 2"/>
           <p:cNvSpPr>
             <a:spLocks noGrp="1"/>
           </p:cNvSpPr>
@@ -223,7 +223,7 @@
       </p:sp>
       <p:sp>
         <p:nvSpPr>
-          <p:cNvPr id="28" name="PlaceHolder 3"/>
+          <p:cNvPr id="26" name="PlaceHolder 3"/>
           <p:cNvSpPr>
             <a:spLocks noGrp="1"/>
           </p:cNvSpPr>
@@ -253,7 +253,7 @@
       </p:sp>
       <p:sp>
         <p:nvSpPr>
-          <p:cNvPr id="29" name="PlaceHolder 4"/>
+          <p:cNvPr id="27" name="PlaceHolder 4"/>
           <p:cNvSpPr>
             <a:spLocks noGrp="1"/>
           </p:cNvSpPr>
@@ -283,7 +283,7 @@
       </p:sp>
       <p:sp>
         <p:nvSpPr>
-          <p:cNvPr id="30" name="PlaceHolder 5"/>
+          <p:cNvPr id="28" name="PlaceHolder 5"/>
           <p:cNvSpPr>
             <a:spLocks noGrp="1"/>
           </p:cNvSpPr>
@@ -335,7 +335,7 @@
       </p:grpSpPr>
       <p:sp>
         <p:nvSpPr>
-          <p:cNvPr id="31" name="PlaceHolder 1"/>
+          <p:cNvPr id="29" name="PlaceHolder 1"/>
           <p:cNvSpPr>
             <a:spLocks noGrp="1"/>
           </p:cNvSpPr>
@@ -364,7 +364,7 @@
       </p:sp>
       <p:sp>
         <p:nvSpPr>
-          <p:cNvPr id="32" name="PlaceHolder 2"/>
+          <p:cNvPr id="30" name="PlaceHolder 2"/>
           <p:cNvSpPr>
             <a:spLocks noGrp="1"/>
           </p:cNvSpPr>
@@ -394,7 +394,7 @@
       </p:sp>
       <p:sp>
         <p:nvSpPr>
-          <p:cNvPr id="33" name="PlaceHolder 3"/>
+          <p:cNvPr id="31" name="PlaceHolder 3"/>
           <p:cNvSpPr>
             <a:spLocks noGrp="1"/>
           </p:cNvSpPr>
@@ -424,7 +424,7 @@
       </p:sp>
       <p:sp>
         <p:nvSpPr>
-          <p:cNvPr id="34" name="PlaceHolder 4"/>
+          <p:cNvPr id="32" name="PlaceHolder 4"/>
           <p:cNvSpPr>
             <a:spLocks noGrp="1"/>
           </p:cNvSpPr>
@@ -454,7 +454,7 @@
       </p:sp>
       <p:sp>
         <p:nvSpPr>
-          <p:cNvPr id="35" name="PlaceHolder 5"/>
+          <p:cNvPr id="33" name="PlaceHolder 5"/>
           <p:cNvSpPr>
             <a:spLocks noGrp="1"/>
           </p:cNvSpPr>
@@ -484,7 +484,7 @@
       </p:sp>
       <p:sp>
         <p:nvSpPr>
-          <p:cNvPr id="36" name="PlaceHolder 6"/>
+          <p:cNvPr id="34" name="PlaceHolder 6"/>
           <p:cNvSpPr>
             <a:spLocks noGrp="1"/>
           </p:cNvSpPr>
@@ -514,7 +514,7 @@
       </p:sp>
       <p:sp>
         <p:nvSpPr>
-          <p:cNvPr id="37" name="PlaceHolder 7"/>
+          <p:cNvPr id="35" name="PlaceHolder 7"/>
           <p:cNvSpPr>
             <a:spLocks noGrp="1"/>
           </p:cNvSpPr>
@@ -566,7 +566,7 @@
       </p:grpSpPr>
       <p:sp>
         <p:nvSpPr>
-          <p:cNvPr id="2" name="PlaceHolder 1"/>
+          <p:cNvPr id="0" name="PlaceHolder 1"/>
           <p:cNvSpPr>
             <a:spLocks noGrp="1"/>
           </p:cNvSpPr>
@@ -595,7 +595,7 @@
       </p:sp>
       <p:sp>
         <p:nvSpPr>
-          <p:cNvPr id="3" name="PlaceHolder 2"/>
+          <p:cNvPr id="1" name="PlaceHolder 2"/>
           <p:cNvSpPr>
             <a:spLocks noGrp="1"/>
           </p:cNvSpPr>
@@ -646,7 +646,7 @@
       </p:grpSpPr>
       <p:sp>
         <p:nvSpPr>
-          <p:cNvPr id="4" name="PlaceHolder 1"/>
+          <p:cNvPr id="2" name="PlaceHolder 1"/>
           <p:cNvSpPr>
             <a:spLocks noGrp="1"/>
           </p:cNvSpPr>
@@ -675,7 +675,7 @@
       </p:sp>
       <p:sp>
         <p:nvSpPr>
-          <p:cNvPr id="5" name="PlaceHolder 2"/>
+          <p:cNvPr id="3" name="PlaceHolder 2"/>
           <p:cNvSpPr>
             <a:spLocks noGrp="1"/>
           </p:cNvSpPr>
@@ -727,7 +727,7 @@
       </p:grpSpPr>
       <p:sp>
         <p:nvSpPr>
-          <p:cNvPr id="6" name="PlaceHolder 1"/>
+          <p:cNvPr id="4" name="PlaceHolder 1"/>
           <p:cNvSpPr>
             <a:spLocks noGrp="1"/>
           </p:cNvSpPr>
@@ -756,7 +756,7 @@
       </p:sp>
       <p:sp>
         <p:nvSpPr>
-          <p:cNvPr id="7" name="PlaceHolder 2"/>
+          <p:cNvPr id="5" name="PlaceHolder 2"/>
           <p:cNvSpPr>
             <a:spLocks noGrp="1"/>
           </p:cNvSpPr>
@@ -786,7 +786,7 @@
       </p:sp>
       <p:sp>
         <p:nvSpPr>
-          <p:cNvPr id="8" name="PlaceHolder 3"/>
+          <p:cNvPr id="6" name="PlaceHolder 3"/>
           <p:cNvSpPr>
             <a:spLocks noGrp="1"/>
           </p:cNvSpPr>
@@ -838,7 +838,7 @@
       </p:grpSpPr>
       <p:sp>
         <p:nvSpPr>
-          <p:cNvPr id="9" name="PlaceHolder 1"/>
+          <p:cNvPr id="7" name="PlaceHolder 1"/>
           <p:cNvSpPr>
             <a:spLocks noGrp="1"/>
           </p:cNvSpPr>
@@ -889,7 +889,7 @@
       </p:grpSpPr>
       <p:sp>
         <p:nvSpPr>
-          <p:cNvPr id="10" name="PlaceHolder 1"/>
+          <p:cNvPr id="8" name="PlaceHolder 1"/>
           <p:cNvSpPr>
             <a:spLocks noGrp="1"/>
           </p:cNvSpPr>
@@ -940,7 +940,7 @@
       </p:grpSpPr>
       <p:sp>
         <p:nvSpPr>
-          <p:cNvPr id="11" name="PlaceHolder 1"/>
+          <p:cNvPr id="9" name="PlaceHolder 1"/>
           <p:cNvSpPr>
             <a:spLocks noGrp="1"/>
           </p:cNvSpPr>
@@ -969,7 +969,7 @@
       </p:sp>
       <p:sp>
         <p:nvSpPr>
-          <p:cNvPr id="12" name="PlaceHolder 2"/>
+          <p:cNvPr id="10" name="PlaceHolder 2"/>
           <p:cNvSpPr>
             <a:spLocks noGrp="1"/>
           </p:cNvSpPr>
@@ -999,7 +999,7 @@
       </p:sp>
       <p:sp>
         <p:nvSpPr>
-          <p:cNvPr id="13" name="PlaceHolder 3"/>
+          <p:cNvPr id="11" name="PlaceHolder 3"/>
           <p:cNvSpPr>
             <a:spLocks noGrp="1"/>
           </p:cNvSpPr>
@@ -1029,7 +1029,7 @@
       </p:sp>
       <p:sp>
         <p:nvSpPr>
-          <p:cNvPr id="14" name="PlaceHolder 4"/>
+          <p:cNvPr id="12" name="PlaceHolder 4"/>
           <p:cNvSpPr>
             <a:spLocks noGrp="1"/>
           </p:cNvSpPr>
@@ -1081,7 +1081,7 @@
       </p:grpSpPr>
       <p:sp>
         <p:nvSpPr>
-          <p:cNvPr id="15" name="PlaceHolder 1"/>
+          <p:cNvPr id="13" name="PlaceHolder 1"/>
           <p:cNvSpPr>
             <a:spLocks noGrp="1"/>
           </p:cNvSpPr>
@@ -1110,7 +1110,7 @@
       </p:sp>
       <p:sp>
         <p:nvSpPr>
-          <p:cNvPr id="16" name="PlaceHolder 2"/>
+          <p:cNvPr id="14" name="PlaceHolder 2"/>
           <p:cNvSpPr>
             <a:spLocks noGrp="1"/>
           </p:cNvSpPr>
@@ -1140,7 +1140,7 @@
       </p:sp>
       <p:sp>
         <p:nvSpPr>
-          <p:cNvPr id="17" name="PlaceHolder 3"/>
+          <p:cNvPr id="15" name="PlaceHolder 3"/>
           <p:cNvSpPr>
             <a:spLocks noGrp="1"/>
           </p:cNvSpPr>
@@ -1170,7 +1170,7 @@
       </p:sp>
       <p:sp>
         <p:nvSpPr>
-          <p:cNvPr id="18" name="PlaceHolder 4"/>
+          <p:cNvPr id="16" name="PlaceHolder 4"/>
           <p:cNvSpPr>
             <a:spLocks noGrp="1"/>
           </p:cNvSpPr>
@@ -1222,7 +1222,7 @@
       </p:grpSpPr>
       <p:sp>
         <p:nvSpPr>
-          <p:cNvPr id="19" name="PlaceHolder 1"/>
+          <p:cNvPr id="17" name="PlaceHolder 1"/>
           <p:cNvSpPr>
             <a:spLocks noGrp="1"/>
           </p:cNvSpPr>
@@ -1251,7 +1251,7 @@
       </p:sp>
       <p:sp>
         <p:nvSpPr>
-          <p:cNvPr id="20" name="PlaceHolder 2"/>
+          <p:cNvPr id="18" name="PlaceHolder 2"/>
           <p:cNvSpPr>
             <a:spLocks noGrp="1"/>
           </p:cNvSpPr>
@@ -1281,7 +1281,7 @@
       </p:sp>
       <p:sp>
         <p:nvSpPr>
-          <p:cNvPr id="21" name="PlaceHolder 3"/>
+          <p:cNvPr id="19" name="PlaceHolder 3"/>
           <p:cNvSpPr>
             <a:spLocks noGrp="1"/>
           </p:cNvSpPr>
@@ -1311,7 +1311,7 @@
       </p:sp>
       <p:sp>
         <p:nvSpPr>
-          <p:cNvPr id="22" name="PlaceHolder 4"/>
+          <p:cNvPr id="20" name="PlaceHolder 4"/>
           <p:cNvSpPr>
             <a:spLocks noGrp="1"/>
           </p:cNvSpPr>
@@ -1361,262 +1361,6 @@
           <a:chExt cx="0" cy="0"/>
         </a:xfrm>
       </p:grpSpPr>
-      <p:sp>
-        <p:nvSpPr>
-          <p:cNvPr id="0" name="PlaceHolder 1"/>
-          <p:cNvSpPr>
-            <a:spLocks noGrp="1"/>
-          </p:cNvSpPr>
-          <p:nvPr>
-            <p:ph type="title"/>
-          </p:nvPr>
-        </p:nvSpPr>
-        <p:spPr>
-          <a:xfrm>
-            <a:off x="504000" y="301320"/>
-            <a:ext cx="9072000" cy="1261800"/>
-          </a:xfrm>
-          <a:prstGeom prst="rect">
-            <a:avLst/>
-          </a:prstGeom>
-        </p:spPr>
-        <p:txBody>
-          <a:bodyPr lIns="0" rIns="0" tIns="0" bIns="0" anchor="ctr"/>
-          <a:p>
-            <a:pPr algn="ctr"/>
-            <a:r>
-              <a:rPr b="0" lang="en-US" sz="4400" spc="-1" strike="noStrike">
-                <a:latin typeface="Arial"/>
-              </a:rPr>
-              <a:t>Click </a:t>
-            </a:r>
-            <a:r>
-              <a:rPr b="0" lang="en-US" sz="4400" spc="-1" strike="noStrike">
-                <a:latin typeface="Arial"/>
-              </a:rPr>
-              <a:t>to </a:t>
-            </a:r>
-            <a:r>
-              <a:rPr b="0" lang="en-US" sz="4400" spc="-1" strike="noStrike">
-                <a:latin typeface="Arial"/>
-              </a:rPr>
-              <a:t>edit </a:t>
-            </a:r>
-            <a:r>
-              <a:rPr b="0" lang="en-US" sz="4400" spc="-1" strike="noStrike">
-                <a:latin typeface="Arial"/>
-              </a:rPr>
-              <a:t>the </a:t>
-            </a:r>
-            <a:r>
-              <a:rPr b="0" lang="en-US" sz="4400" spc="-1" strike="noStrike">
-                <a:latin typeface="Arial"/>
-              </a:rPr>
-              <a:t>title </a:t>
-            </a:r>
-            <a:r>
-              <a:rPr b="0" lang="en-US" sz="4400" spc="-1" strike="noStrike">
-                <a:latin typeface="Arial"/>
-              </a:rPr>
-              <a:t>text </a:t>
-            </a:r>
-            <a:r>
-              <a:rPr b="0" lang="en-US" sz="4400" spc="-1" strike="noStrike">
-                <a:latin typeface="Arial"/>
-              </a:rPr>
-              <a:t>form</a:t>
-            </a:r>
-            <a:r>
-              <a:rPr b="0" lang="en-US" sz="4400" spc="-1" strike="noStrike">
-                <a:latin typeface="Arial"/>
-              </a:rPr>
-              <a:t>at</a:t>
-            </a:r>
-            <a:endParaRPr b="0" lang="en-US" sz="4400" spc="-1" strike="noStrike">
-              <a:latin typeface="Arial"/>
-            </a:endParaRPr>
-          </a:p>
-        </p:txBody>
-      </p:sp>
-      <p:sp>
-        <p:nvSpPr>
-          <p:cNvPr id="1" name="PlaceHolder 2"/>
-          <p:cNvSpPr>
-            <a:spLocks noGrp="1"/>
-          </p:cNvSpPr>
-          <p:nvPr>
-            <p:ph type="body"/>
-          </p:nvPr>
-        </p:nvSpPr>
-        <p:spPr>
-          <a:xfrm>
-            <a:off x="504000" y="1768680"/>
-            <a:ext cx="9072000" cy="4384080"/>
-          </a:xfrm>
-          <a:prstGeom prst="rect">
-            <a:avLst/>
-          </a:prstGeom>
-        </p:spPr>
-        <p:txBody>
-          <a:bodyPr lIns="0" rIns="0" tIns="0" bIns="0">
-            <a:normAutofit/>
-          </a:bodyPr>
-          <a:p>
-            <a:pPr marL="432000" indent="-324000">
-              <a:spcBef>
-                <a:spcPts val="1417"/>
-              </a:spcBef>
-              <a:buClr>
-                <a:srgbClr val="000000"/>
-              </a:buClr>
-              <a:buSzPct val="45000"/>
-              <a:buFont typeface="Wingdings" charset="2"/>
-              <a:buChar char=""/>
-            </a:pPr>
-            <a:r>
-              <a:rPr b="0" lang="en-US" sz="3200" spc="-1" strike="noStrike">
-                <a:latin typeface="Arial"/>
-              </a:rPr>
-              <a:t>Click to edit the outline text format</a:t>
-            </a:r>
-            <a:endParaRPr b="0" lang="en-US" sz="3200" spc="-1" strike="noStrike">
-              <a:latin typeface="Arial"/>
-            </a:endParaRPr>
-          </a:p>
-          <a:p>
-            <a:pPr lvl="1" marL="864000" indent="-324000">
-              <a:spcBef>
-                <a:spcPts val="1134"/>
-              </a:spcBef>
-              <a:buClr>
-                <a:srgbClr val="000000"/>
-              </a:buClr>
-              <a:buSzPct val="75000"/>
-              <a:buFont typeface="Symbol" charset="2"/>
-              <a:buChar char=""/>
-            </a:pPr>
-            <a:r>
-              <a:rPr b="0" lang="en-US" sz="2800" spc="-1" strike="noStrike">
-                <a:latin typeface="Arial"/>
-              </a:rPr>
-              <a:t>Second Outline Level</a:t>
-            </a:r>
-            <a:endParaRPr b="0" lang="en-US" sz="2800" spc="-1" strike="noStrike">
-              <a:latin typeface="Arial"/>
-            </a:endParaRPr>
-          </a:p>
-          <a:p>
-            <a:pPr lvl="2" marL="1296000" indent="-288000">
-              <a:spcBef>
-                <a:spcPts val="850"/>
-              </a:spcBef>
-              <a:buClr>
-                <a:srgbClr val="000000"/>
-              </a:buClr>
-              <a:buSzPct val="45000"/>
-              <a:buFont typeface="Wingdings" charset="2"/>
-              <a:buChar char=""/>
-            </a:pPr>
-            <a:r>
-              <a:rPr b="0" lang="en-US" sz="2400" spc="-1" strike="noStrike">
-                <a:latin typeface="Arial"/>
-              </a:rPr>
-              <a:t>Third Outline Level</a:t>
-            </a:r>
-            <a:endParaRPr b="0" lang="en-US" sz="2400" spc="-1" strike="noStrike">
-              <a:latin typeface="Arial"/>
-            </a:endParaRPr>
-          </a:p>
-          <a:p>
-            <a:pPr lvl="3" marL="1728000" indent="-216000">
-              <a:spcBef>
-                <a:spcPts val="567"/>
-              </a:spcBef>
-              <a:buClr>
-                <a:srgbClr val="000000"/>
-              </a:buClr>
-              <a:buSzPct val="75000"/>
-              <a:buFont typeface="Symbol" charset="2"/>
-              <a:buChar char=""/>
-            </a:pPr>
-            <a:r>
-              <a:rPr b="0" lang="en-US" sz="2000" spc="-1" strike="noStrike">
-                <a:latin typeface="Arial"/>
-              </a:rPr>
-              <a:t>Fourth Outline Level</a:t>
-            </a:r>
-            <a:endParaRPr b="0" lang="en-US" sz="2000" spc="-1" strike="noStrike">
-              <a:latin typeface="Arial"/>
-            </a:endParaRPr>
-          </a:p>
-          <a:p>
-            <a:pPr lvl="4" marL="2160000" indent="-216000">
-              <a:spcBef>
-                <a:spcPts val="283"/>
-              </a:spcBef>
-              <a:buClr>
-                <a:srgbClr val="000000"/>
-              </a:buClr>
-              <a:buSzPct val="45000"/>
-              <a:buFont typeface="Wingdings" charset="2"/>
-              <a:buChar char=""/>
-            </a:pPr>
-            <a:r>
-              <a:rPr b="0" lang="en-US" sz="2000" spc="-1" strike="noStrike">
-                <a:latin typeface="Arial"/>
-              </a:rPr>
-              <a:t>Fifth Outline Level</a:t>
-            </a:r>
-            <a:endParaRPr b="0" lang="en-US" sz="2000" spc="-1" strike="noStrike">
-              <a:latin typeface="Arial"/>
-            </a:endParaRPr>
-          </a:p>
-          <a:p>
-            <a:pPr lvl="5" marL="2592000" indent="-216000">
-              <a:spcBef>
-                <a:spcPts val="283"/>
-              </a:spcBef>
-              <a:buClr>
-                <a:srgbClr val="000000"/>
-              </a:buClr>
-              <a:buSzPct val="45000"/>
-              <a:buFont typeface="Wingdings" charset="2"/>
-              <a:buChar char=""/>
-            </a:pPr>
-            <a:r>
-              <a:rPr b="0" lang="en-US" sz="2000" spc="-1" strike="noStrike">
-                <a:latin typeface="Arial"/>
-              </a:rPr>
-              <a:t>Sixth Outline Level</a:t>
-            </a:r>
-            <a:endParaRPr b="0" lang="en-US" sz="2000" spc="-1" strike="noStrike">
-              <a:latin typeface="Arial"/>
-            </a:endParaRPr>
-          </a:p>
-          <a:p>
-            <a:pPr lvl="6" marL="3024000" indent="-216000">
-              <a:spcBef>
-                <a:spcPts val="283"/>
-              </a:spcBef>
-              <a:buClr>
-                <a:srgbClr val="000000"/>
-              </a:buClr>
-              <a:buSzPct val="45000"/>
-              <a:buFont typeface="Wingdings" charset="2"/>
-              <a:buChar char=""/>
-            </a:pPr>
-            <a:r>
-              <a:rPr b="0" lang="en-US" sz="2000" spc="-1" strike="noStrike">
-                <a:latin typeface="Arial"/>
-              </a:rPr>
-              <a:t>Seventh Outline Level</a:t>
-            </a:r>
-            <a:endParaRPr b="0" lang="en-US" sz="2000" spc="-1" strike="noStrike">
-              <a:latin typeface="Arial"/>
-            </a:endParaRPr>
-          </a:p>
-        </p:txBody>
-      </p:sp>
     </p:spTree>
   </p:cSld>
   <p:clrMap bg1="lt1" bg2="lt2" tx1="dk1" tx2="dk2" accent1="accent1" accent2="accent2" accent3="accent3" accent4="accent4" accent5="accent5" accent6="accent6" hlink="hlink" folHlink="folHlink"/>
@@ -1656,14 +1400,14 @@
       </p:grpSpPr>
       <p:sp>
         <p:nvSpPr>
-          <p:cNvPr id="38" name="CustomShape 1"/>
+          <p:cNvPr id="36" name="CustomShape 1"/>
           <p:cNvSpPr/>
           <p:nvPr/>
         </p:nvSpPr>
         <p:spPr>
           <a:xfrm>
             <a:off x="6309360" y="457200"/>
-            <a:ext cx="924480" cy="314640"/>
+            <a:ext cx="924120" cy="314280"/>
           </a:xfrm>
           <a:prstGeom prst="rect">
             <a:avLst/>
@@ -1688,7 +1432,7 @@
               </a:lnSpc>
             </a:pPr>
             <a:r>
-              <a:rPr b="0" lang="en-US" sz="1200" spc="-1" strike="noStrike">
+              <a:rPr b="1" lang="en-US" sz="1200" spc="-1" strike="noStrike">
                 <a:solidFill>
                   <a:srgbClr val="000000"/>
                 </a:solidFill>
@@ -1697,22 +1441,22 @@
               </a:rPr>
               <a:t>Board</a:t>
             </a:r>
-            <a:endParaRPr b="0" lang="en-US" sz="1200" spc="-1" strike="noStrike">
-              <a:latin typeface="Arial"/>
-            </a:endParaRPr>
-          </a:p>
-        </p:txBody>
-      </p:sp>
-      <p:sp>
-        <p:nvSpPr>
-          <p:cNvPr id="39" name="CustomShape 2"/>
+            <a:endParaRPr b="1" lang="en-US" sz="1200" spc="-1" strike="noStrike">
+              <a:latin typeface="Arial"/>
+            </a:endParaRPr>
+          </a:p>
+        </p:txBody>
+      </p:sp>
+      <p:sp>
+        <p:nvSpPr>
+          <p:cNvPr id="37" name="CustomShape 2"/>
           <p:cNvSpPr/>
           <p:nvPr/>
         </p:nvSpPr>
         <p:spPr>
           <a:xfrm>
             <a:off x="4934880" y="1513080"/>
-            <a:ext cx="1097280" cy="314640"/>
+            <a:ext cx="1096920" cy="314280"/>
           </a:xfrm>
           <a:prstGeom prst="rect">
             <a:avLst/>
@@ -1737,7 +1481,7 @@
               </a:lnSpc>
             </a:pPr>
             <a:r>
-              <a:rPr b="0" lang="en-US" sz="1200" spc="-1" strike="noStrike">
+              <a:rPr b="1" lang="en-US" sz="1200" spc="-1" strike="noStrike">
                 <a:solidFill>
                   <a:srgbClr val="000000"/>
                 </a:solidFill>
@@ -1746,22 +1490,22 @@
               </a:rPr>
               <a:t>RealBoard</a:t>
             </a:r>
-            <a:endParaRPr b="0" lang="en-US" sz="1200" spc="-1" strike="noStrike">
-              <a:latin typeface="Arial"/>
-            </a:endParaRPr>
-          </a:p>
-        </p:txBody>
-      </p:sp>
-      <p:sp>
-        <p:nvSpPr>
-          <p:cNvPr id="40" name="CustomShape 3"/>
+            <a:endParaRPr b="1" lang="en-US" sz="1200" spc="-1" strike="noStrike">
+              <a:latin typeface="Arial"/>
+            </a:endParaRPr>
+          </a:p>
+        </p:txBody>
+      </p:sp>
+      <p:sp>
+        <p:nvSpPr>
+          <p:cNvPr id="38" name="CustomShape 3"/>
           <p:cNvSpPr/>
           <p:nvPr/>
         </p:nvSpPr>
         <p:spPr>
           <a:xfrm>
             <a:off x="2399760" y="2468880"/>
-            <a:ext cx="1440720" cy="314640"/>
+            <a:ext cx="1440360" cy="314280"/>
           </a:xfrm>
           <a:prstGeom prst="rect">
             <a:avLst/>
@@ -1786,7 +1530,7 @@
               </a:lnSpc>
             </a:pPr>
             <a:r>
-              <a:rPr b="0" lang="en-US" sz="1200" spc="-1" strike="noStrike">
+              <a:rPr b="1" lang="en-US" sz="1200" spc="-1" strike="noStrike">
                 <a:solidFill>
                   <a:srgbClr val="000000"/>
                 </a:solidFill>
@@ -1795,22 +1539,22 @@
               </a:rPr>
               <a:t>ArduinoBoard</a:t>
             </a:r>
-            <a:endParaRPr b="0" lang="en-US" sz="1200" spc="-1" strike="noStrike">
-              <a:latin typeface="Arial"/>
-            </a:endParaRPr>
-          </a:p>
-        </p:txBody>
-      </p:sp>
-      <p:sp>
-        <p:nvSpPr>
-          <p:cNvPr id="41" name="CustomShape 4"/>
+            <a:endParaRPr b="1" lang="en-US" sz="1200" spc="-1" strike="noStrike">
+              <a:latin typeface="Arial"/>
+            </a:endParaRPr>
+          </a:p>
+        </p:txBody>
+      </p:sp>
+      <p:sp>
+        <p:nvSpPr>
+          <p:cNvPr id="39" name="CustomShape 4"/>
           <p:cNvSpPr/>
           <p:nvPr/>
         </p:nvSpPr>
         <p:spPr>
           <a:xfrm>
             <a:off x="7635240" y="1508760"/>
-            <a:ext cx="1473120" cy="314640"/>
+            <a:ext cx="1472760" cy="314280"/>
           </a:xfrm>
           <a:prstGeom prst="rect">
             <a:avLst/>
@@ -1835,7 +1579,7 @@
               </a:lnSpc>
             </a:pPr>
             <a:r>
-              <a:rPr b="0" i="1" lang="en-US" sz="1200" spc="-1" strike="noStrike">
+              <a:rPr b="1" i="1" lang="en-US" sz="1200" spc="-1" strike="noStrike">
                 <a:solidFill>
                   <a:srgbClr val="000000"/>
                 </a:solidFill>
@@ -1844,22 +1588,22 @@
               </a:rPr>
               <a:t>SimulatedBoard</a:t>
             </a:r>
-            <a:endParaRPr b="0" i="1" lang="en-US" sz="1200" spc="-1" strike="noStrike">
-              <a:latin typeface="Arial"/>
-            </a:endParaRPr>
-          </a:p>
-        </p:txBody>
-      </p:sp>
-      <p:sp>
-        <p:nvSpPr>
-          <p:cNvPr id="42" name="CustomShape 5"/>
+            <a:endParaRPr b="1" lang="en-US" sz="1200" spc="-1" strike="noStrike">
+              <a:latin typeface="Arial"/>
+            </a:endParaRPr>
+          </a:p>
+        </p:txBody>
+      </p:sp>
+      <p:sp>
+        <p:nvSpPr>
+          <p:cNvPr id="40" name="CustomShape 5"/>
           <p:cNvSpPr/>
           <p:nvPr/>
         </p:nvSpPr>
         <p:spPr>
           <a:xfrm>
             <a:off x="4206240" y="2468880"/>
-            <a:ext cx="2286000" cy="314640"/>
+            <a:ext cx="2285640" cy="314280"/>
           </a:xfrm>
           <a:prstGeom prst="rect">
             <a:avLst/>
@@ -1884,113 +1628,244 @@
               </a:lnSpc>
             </a:pPr>
             <a:r>
-              <a:rPr b="0" lang="en-US" sz="1200" spc="-1" strike="noStrike">
+              <a:rPr b="1" lang="en-US" sz="1200" spc="-1" strike="noStrike">
                 <a:solidFill>
                   <a:srgbClr val="000000"/>
                 </a:solidFill>
                 <a:latin typeface="Arial"/>
                 <a:ea typeface="DejaVu Sans"/>
               </a:rPr>
-              <a:t>SoftwareQua</a:t>
+              <a:t>SoftwareQuaternionBoard</a:t>
             </a:r>
+            <a:endParaRPr b="1" lang="en-US" sz="1200" spc="-1" strike="noStrike">
+              <a:latin typeface="Arial"/>
+            </a:endParaRPr>
+          </a:p>
+        </p:txBody>
+      </p:sp>
+      <p:sp>
+        <p:nvSpPr>
+          <p:cNvPr id="41" name="CustomShape 6"/>
+          <p:cNvSpPr/>
+          <p:nvPr/>
+        </p:nvSpPr>
+        <p:spPr>
+          <a:xfrm flipH="1">
+            <a:off x="5483520" y="771840"/>
+            <a:ext cx="1288080" cy="741240"/>
+          </a:xfrm>
+          <a:custGeom>
+            <a:avLst/>
+            <a:gdLst/>
+            <a:ahLst/>
+            <a:rect l="l" t="t" r="r" b="b"/>
+            <a:pathLst>
+              <a:path w="21600" h="21600">
+                <a:moveTo>
+                  <a:pt x="0" y="0"/>
+                </a:moveTo>
+                <a:lnTo>
+                  <a:pt x="21600" y="21600"/>
+                </a:lnTo>
+              </a:path>
+            </a:pathLst>
+          </a:custGeom>
+          <a:noFill/>
+          <a:ln>
+            <a:solidFill>
+              <a:srgbClr val="000000"/>
+            </a:solidFill>
+          </a:ln>
+        </p:spPr>
+        <p:style>
+          <a:lnRef idx="0"/>
+          <a:fillRef idx="0"/>
+          <a:effectRef idx="0"/>
+          <a:fontRef idx="minor"/>
+        </p:style>
+      </p:sp>
+      <p:sp>
+        <p:nvSpPr>
+          <p:cNvPr id="42" name="CustomShape 7"/>
+          <p:cNvSpPr/>
+          <p:nvPr/>
+        </p:nvSpPr>
+        <p:spPr>
+          <a:xfrm flipV="1">
+            <a:off x="3120120" y="1827000"/>
+            <a:ext cx="2363400" cy="641160"/>
+          </a:xfrm>
+          <a:custGeom>
+            <a:avLst/>
+            <a:gdLst/>
+            <a:ahLst/>
+            <a:rect l="l" t="t" r="r" b="b"/>
+            <a:pathLst>
+              <a:path w="21600" h="21600">
+                <a:moveTo>
+                  <a:pt x="0" y="0"/>
+                </a:moveTo>
+                <a:lnTo>
+                  <a:pt x="21600" y="21600"/>
+                </a:lnTo>
+              </a:path>
+            </a:pathLst>
+          </a:custGeom>
+          <a:noFill/>
+          <a:ln>
+            <a:solidFill>
+              <a:srgbClr val="000000"/>
+            </a:solidFill>
+          </a:ln>
+        </p:spPr>
+        <p:style>
+          <a:lnRef idx="0"/>
+          <a:fillRef idx="0"/>
+          <a:effectRef idx="0"/>
+          <a:fontRef idx="minor"/>
+        </p:style>
+      </p:sp>
+      <p:sp>
+        <p:nvSpPr>
+          <p:cNvPr id="43" name="CustomShape 8"/>
+          <p:cNvSpPr/>
+          <p:nvPr/>
+        </p:nvSpPr>
+        <p:spPr>
+          <a:xfrm>
+            <a:off x="6771600" y="771840"/>
+            <a:ext cx="1600200" cy="736920"/>
+          </a:xfrm>
+          <a:custGeom>
+            <a:avLst/>
+            <a:gdLst/>
+            <a:ahLst/>
+            <a:rect l="l" t="t" r="r" b="b"/>
+            <a:pathLst>
+              <a:path w="21600" h="21600">
+                <a:moveTo>
+                  <a:pt x="0" y="0"/>
+                </a:moveTo>
+                <a:lnTo>
+                  <a:pt x="21600" y="21600"/>
+                </a:lnTo>
+              </a:path>
+            </a:pathLst>
+          </a:custGeom>
+          <a:noFill/>
+          <a:ln>
+            <a:solidFill>
+              <a:srgbClr val="000000"/>
+            </a:solidFill>
+          </a:ln>
+        </p:spPr>
+        <p:style>
+          <a:lnRef idx="0"/>
+          <a:fillRef idx="0"/>
+          <a:effectRef idx="0"/>
+          <a:fontRef idx="minor"/>
+        </p:style>
+      </p:sp>
+      <p:sp>
+        <p:nvSpPr>
+          <p:cNvPr id="44" name="CustomShape 9"/>
+          <p:cNvSpPr/>
+          <p:nvPr/>
+        </p:nvSpPr>
+        <p:spPr>
+          <a:xfrm>
+            <a:off x="402480" y="3682800"/>
+            <a:ext cx="1299960" cy="314280"/>
+          </a:xfrm>
+          <a:prstGeom prst="rect">
+            <a:avLst/>
+          </a:prstGeom>
+          <a:noFill/>
+          <a:ln>
+            <a:noFill/>
+          </a:ln>
+        </p:spPr>
+        <p:style>
+          <a:lnRef idx="0"/>
+          <a:fillRef idx="0"/>
+          <a:effectRef idx="0"/>
+          <a:fontRef idx="minor"/>
+        </p:style>
+        <p:txBody>
+          <a:bodyPr lIns="90000" rIns="90000" tIns="45000" bIns="45000"/>
+          <a:p>
+            <a:pPr>
+              <a:lnSpc>
+                <a:spcPct val="100000"/>
+              </a:lnSpc>
+            </a:pPr>
             <a:r>
-              <a:rPr b="0" lang="en-US" sz="1200" spc="-1" strike="noStrike">
+              <a:rPr b="1" lang="en-US" sz="1200" spc="-1" strike="noStrike">
                 <a:solidFill>
                   <a:srgbClr val="000000"/>
                 </a:solidFill>
                 <a:latin typeface="Arial"/>
                 <a:ea typeface="DejaVu Sans"/>
               </a:rPr>
-              <a:t>ternionBoard</a:t>
+              <a:t>SentralBoard</a:t>
             </a:r>
-            <a:endParaRPr b="0" lang="en-US" sz="1200" spc="-1" strike="noStrike">
-              <a:latin typeface="Arial"/>
-            </a:endParaRPr>
-          </a:p>
-        </p:txBody>
-      </p:sp>
-      <p:cxnSp>
-        <p:nvCxnSpPr>
-          <p:cNvPr id="43" name="Line 6"/>
-          <p:cNvCxnSpPr>
-            <a:stCxn id="38" idx="2"/>
-            <a:endCxn id="39" idx="0"/>
-          </p:cNvCxnSpPr>
-          <p:nvPr/>
-        </p:nvCxnSpPr>
+            <a:endParaRPr b="1" lang="en-US" sz="1200" spc="-1" strike="noStrike">
+              <a:latin typeface="Arial"/>
+            </a:endParaRPr>
+          </a:p>
+        </p:txBody>
+      </p:sp>
+      <p:sp>
+        <p:nvSpPr>
+          <p:cNvPr id="45" name="CustomShape 10"/>
+          <p:cNvSpPr/>
+          <p:nvPr/>
+        </p:nvSpPr>
         <p:spPr>
           <a:xfrm flipH="1">
-            <a:off x="5483520" y="771840"/>
-            <a:ext cx="1288440" cy="741600"/>
-          </a:xfrm>
-          <a:prstGeom prst="straightConnector1">
-            <a:avLst/>
-          </a:prstGeom>
+            <a:off x="1051920" y="2783520"/>
+            <a:ext cx="2067480" cy="899280"/>
+          </a:xfrm>
+          <a:custGeom>
+            <a:avLst/>
+            <a:gdLst/>
+            <a:ahLst/>
+            <a:rect l="l" t="t" r="r" b="b"/>
+            <a:pathLst>
+              <a:path w="21600" h="21600">
+                <a:moveTo>
+                  <a:pt x="0" y="0"/>
+                </a:moveTo>
+                <a:lnTo>
+                  <a:pt x="21600" y="21600"/>
+                </a:lnTo>
+              </a:path>
+            </a:pathLst>
+          </a:custGeom>
+          <a:noFill/>
           <a:ln>
             <a:solidFill>
               <a:srgbClr val="000000"/>
             </a:solidFill>
           </a:ln>
         </p:spPr>
-      </p:cxnSp>
-      <p:cxnSp>
-        <p:nvCxnSpPr>
-          <p:cNvPr id="44" name="Line 7"/>
-          <p:cNvCxnSpPr>
-            <a:stCxn id="40" idx="0"/>
-            <a:endCxn id="39" idx="2"/>
-          </p:cNvCxnSpPr>
-          <p:nvPr/>
-        </p:nvCxnSpPr>
-        <p:spPr>
-          <a:xfrm flipV="1">
-            <a:off x="3120120" y="1827720"/>
-            <a:ext cx="2363760" cy="641520"/>
-          </a:xfrm>
-          <a:prstGeom prst="straightConnector1">
-            <a:avLst/>
-          </a:prstGeom>
-          <a:ln>
-            <a:solidFill>
-              <a:srgbClr val="000000"/>
-            </a:solidFill>
-          </a:ln>
-        </p:spPr>
-      </p:cxnSp>
-      <p:cxnSp>
-        <p:nvCxnSpPr>
-          <p:cNvPr id="45" name="Line 8"/>
-          <p:cNvCxnSpPr>
-            <a:stCxn id="38" idx="2"/>
-            <a:endCxn id="41" idx="0"/>
-          </p:cNvCxnSpPr>
-          <p:nvPr/>
-        </p:nvCxnSpPr>
-        <p:spPr>
-          <a:xfrm>
-            <a:off x="6771600" y="771840"/>
-            <a:ext cx="1600560" cy="737280"/>
-          </a:xfrm>
-          <a:prstGeom prst="straightConnector1">
-            <a:avLst/>
-          </a:prstGeom>
-          <a:ln>
-            <a:solidFill>
-              <a:srgbClr val="000000"/>
-            </a:solidFill>
-          </a:ln>
-        </p:spPr>
-      </p:cxnSp>
-      <p:sp>
-        <p:nvSpPr>
-          <p:cNvPr id="46" name="CustomShape 9"/>
-          <p:cNvSpPr/>
-          <p:nvPr/>
-        </p:nvSpPr>
-        <p:spPr>
-          <a:xfrm>
-            <a:off x="402480" y="3682800"/>
-            <a:ext cx="1300320" cy="314640"/>
+        <p:style>
+          <a:lnRef idx="0"/>
+          <a:fillRef idx="0"/>
+          <a:effectRef idx="0"/>
+          <a:fontRef idx="minor"/>
+        </p:style>
+      </p:sp>
+      <p:sp>
+        <p:nvSpPr>
+          <p:cNvPr id="46" name="CustomShape 11"/>
+          <p:cNvSpPr/>
+          <p:nvPr/>
+        </p:nvSpPr>
+        <p:spPr>
+          <a:xfrm>
+            <a:off x="-2160" y="4400640"/>
+            <a:ext cx="891720" cy="314280"/>
           </a:xfrm>
           <a:prstGeom prst="rect">
             <a:avLst/>
@@ -2015,90 +1890,7 @@
               </a:lnSpc>
             </a:pPr>
             <a:r>
-              <a:rPr b="0" lang="en-US" sz="1200" spc="-1" strike="noStrike">
-                <a:solidFill>
-                  <a:srgbClr val="000000"/>
-                </a:solidFill>
-                <a:latin typeface="Arial"/>
-                <a:ea typeface="DejaVu Sans"/>
-              </a:rPr>
-              <a:t>Sentral</a:t>
-            </a:r>
-            <a:r>
-              <a:rPr b="0" lang="en-US" sz="1200" spc="-1" strike="noStrike">
-                <a:solidFill>
-                  <a:srgbClr val="000000"/>
-                </a:solidFill>
-                <a:latin typeface="Arial"/>
-                <a:ea typeface="DejaVu Sans"/>
-              </a:rPr>
-              <a:t>Board</a:t>
-            </a:r>
-            <a:endParaRPr b="0" lang="en-US" sz="1200" spc="-1" strike="noStrike">
-              <a:latin typeface="Arial"/>
-            </a:endParaRPr>
-          </a:p>
-        </p:txBody>
-      </p:sp>
-      <p:cxnSp>
-        <p:nvCxnSpPr>
-          <p:cNvPr id="47" name="Line 10"/>
-          <p:cNvCxnSpPr>
-            <a:stCxn id="40" idx="2"/>
-            <a:endCxn id="46" idx="0"/>
-          </p:cNvCxnSpPr>
-          <p:nvPr/>
-        </p:nvCxnSpPr>
-        <p:spPr>
-          <a:xfrm flipH="1">
-            <a:off x="1052640" y="2783520"/>
-            <a:ext cx="2067840" cy="899640"/>
-          </a:xfrm>
-          <a:prstGeom prst="straightConnector1">
-            <a:avLst/>
-          </a:prstGeom>
-          <a:ln>
-            <a:solidFill>
-              <a:srgbClr val="000000"/>
-            </a:solidFill>
-          </a:ln>
-        </p:spPr>
-      </p:cxnSp>
-      <p:sp>
-        <p:nvSpPr>
-          <p:cNvPr id="48" name="CustomShape 11"/>
-          <p:cNvSpPr/>
-          <p:nvPr/>
-        </p:nvSpPr>
-        <p:spPr>
-          <a:xfrm>
-            <a:off x="-2160" y="4400640"/>
-            <a:ext cx="892080" cy="314640"/>
-          </a:xfrm>
-          <a:prstGeom prst="rect">
-            <a:avLst/>
-          </a:prstGeom>
-          <a:noFill/>
-          <a:ln>
-            <a:noFill/>
-          </a:ln>
-        </p:spPr>
-        <p:style>
-          <a:lnRef idx="0"/>
-          <a:fillRef idx="0"/>
-          <a:effectRef idx="0"/>
-          <a:fontRef idx="minor"/>
-        </p:style>
-        <p:txBody>
-          <a:bodyPr lIns="90000" rIns="90000" tIns="45000" bIns="45000"/>
-          <a:p>
-            <a:pPr>
-              <a:lnSpc>
-                <a:spcPct val="100000"/>
-              </a:lnSpc>
-            </a:pPr>
-            <a:r>
-              <a:rPr b="0" lang="en-US" sz="1200" spc="-1" strike="noStrike">
+              <a:rPr b="1" lang="en-US" sz="1200" spc="-1" strike="noStrike">
                 <a:solidFill>
                   <a:srgbClr val="000000"/>
                 </a:solidFill>
@@ -2107,22 +1899,22 @@
               </a:rPr>
               <a:t>Ladybug</a:t>
             </a:r>
-            <a:endParaRPr b="0" lang="en-US" sz="1200" spc="-1" strike="noStrike">
-              <a:latin typeface="Arial"/>
-            </a:endParaRPr>
-          </a:p>
-        </p:txBody>
-      </p:sp>
-      <p:sp>
-        <p:nvSpPr>
-          <p:cNvPr id="49" name="CustomShape 12"/>
+            <a:endParaRPr b="1" lang="en-US" sz="1200" spc="-1" strike="noStrike">
+              <a:latin typeface="Arial"/>
+            </a:endParaRPr>
+          </a:p>
+        </p:txBody>
+      </p:sp>
+      <p:sp>
+        <p:nvSpPr>
+          <p:cNvPr id="47" name="CustomShape 12"/>
           <p:cNvSpPr/>
           <p:nvPr/>
         </p:nvSpPr>
         <p:spPr>
           <a:xfrm>
             <a:off x="740520" y="4389120"/>
-            <a:ext cx="1103760" cy="314640"/>
+            <a:ext cx="1103400" cy="314280"/>
           </a:xfrm>
           <a:prstGeom prst="rect">
             <a:avLst/>
@@ -2147,7 +1939,7 @@
               </a:lnSpc>
             </a:pPr>
             <a:r>
-              <a:rPr b="0" lang="en-US" sz="1200" spc="-1" strike="noStrike">
+              <a:rPr b="1" lang="en-US" sz="1200" spc="-1" strike="noStrike">
                 <a:solidFill>
                   <a:srgbClr val="000000"/>
                 </a:solidFill>
@@ -2156,70 +1948,104 @@
               </a:rPr>
               <a:t>SuperFly</a:t>
             </a:r>
-            <a:endParaRPr b="0" lang="en-US" sz="1200" spc="-1" strike="noStrike">
-              <a:latin typeface="Arial"/>
-            </a:endParaRPr>
-          </a:p>
-        </p:txBody>
-      </p:sp>
-      <p:cxnSp>
-        <p:nvCxnSpPr>
-          <p:cNvPr id="50" name="Line 13"/>
-          <p:cNvCxnSpPr>
-            <a:stCxn id="46" idx="2"/>
-            <a:endCxn id="48" idx="0"/>
-          </p:cNvCxnSpPr>
-          <p:nvPr/>
-        </p:nvCxnSpPr>
+            <a:endParaRPr b="1" lang="en-US" sz="1200" spc="-1" strike="noStrike">
+              <a:latin typeface="Arial"/>
+            </a:endParaRPr>
+          </a:p>
+        </p:txBody>
+      </p:sp>
+      <p:sp>
+        <p:nvSpPr>
+          <p:cNvPr id="48" name="CustomShape 13"/>
+          <p:cNvSpPr/>
+          <p:nvPr/>
+        </p:nvSpPr>
         <p:spPr>
           <a:xfrm flipH="1">
-            <a:off x="443880" y="3997440"/>
-            <a:ext cx="609120" cy="403560"/>
-          </a:xfrm>
-          <a:prstGeom prst="straightConnector1">
-            <a:avLst/>
-          </a:prstGeom>
+            <a:off x="443160" y="3997440"/>
+            <a:ext cx="608760" cy="403200"/>
+          </a:xfrm>
+          <a:custGeom>
+            <a:avLst/>
+            <a:gdLst/>
+            <a:ahLst/>
+            <a:rect l="l" t="t" r="r" b="b"/>
+            <a:pathLst>
+              <a:path w="21600" h="21600">
+                <a:moveTo>
+                  <a:pt x="0" y="0"/>
+                </a:moveTo>
+                <a:lnTo>
+                  <a:pt x="21600" y="21600"/>
+                </a:lnTo>
+              </a:path>
+            </a:pathLst>
+          </a:custGeom>
+          <a:noFill/>
           <a:ln>
             <a:solidFill>
               <a:srgbClr val="000000"/>
             </a:solidFill>
           </a:ln>
         </p:spPr>
-      </p:cxnSp>
-      <p:cxnSp>
-        <p:nvCxnSpPr>
-          <p:cNvPr id="51" name="Line 14"/>
-          <p:cNvCxnSpPr>
-            <a:stCxn id="46" idx="2"/>
-            <a:endCxn id="49" idx="0"/>
-          </p:cNvCxnSpPr>
-          <p:nvPr/>
-        </p:nvCxnSpPr>
+        <p:style>
+          <a:lnRef idx="0"/>
+          <a:fillRef idx="0"/>
+          <a:effectRef idx="0"/>
+          <a:fontRef idx="minor"/>
+        </p:style>
+      </p:sp>
+      <p:sp>
+        <p:nvSpPr>
+          <p:cNvPr id="49" name="CustomShape 14"/>
+          <p:cNvSpPr/>
+          <p:nvPr/>
+        </p:nvSpPr>
         <p:spPr>
           <a:xfrm>
             <a:off x="1052640" y="3997440"/>
-            <a:ext cx="240120" cy="392040"/>
-          </a:xfrm>
-          <a:prstGeom prst="straightConnector1">
-            <a:avLst/>
-          </a:prstGeom>
+            <a:ext cx="239760" cy="391680"/>
+          </a:xfrm>
+          <a:custGeom>
+            <a:avLst/>
+            <a:gdLst/>
+            <a:ahLst/>
+            <a:rect l="l" t="t" r="r" b="b"/>
+            <a:pathLst>
+              <a:path w="21600" h="21600">
+                <a:moveTo>
+                  <a:pt x="0" y="0"/>
+                </a:moveTo>
+                <a:lnTo>
+                  <a:pt x="21600" y="21600"/>
+                </a:lnTo>
+              </a:path>
+            </a:pathLst>
+          </a:custGeom>
+          <a:noFill/>
           <a:ln>
             <a:solidFill>
               <a:srgbClr val="000000"/>
             </a:solidFill>
           </a:ln>
         </p:spPr>
-      </p:cxnSp>
-      <p:sp>
-        <p:nvSpPr>
-          <p:cNvPr id="52" name="CustomShape 15"/>
+        <p:style>
+          <a:lnRef idx="0"/>
+          <a:fillRef idx="0"/>
+          <a:effectRef idx="0"/>
+          <a:fontRef idx="minor"/>
+        </p:style>
+      </p:sp>
+      <p:sp>
+        <p:nvSpPr>
+          <p:cNvPr id="50" name="CustomShape 15"/>
           <p:cNvSpPr/>
           <p:nvPr/>
         </p:nvSpPr>
         <p:spPr>
           <a:xfrm>
             <a:off x="3828240" y="3693600"/>
-            <a:ext cx="1554480" cy="314640"/>
+            <a:ext cx="1554120" cy="314280"/>
           </a:xfrm>
           <a:prstGeom prst="rect">
             <a:avLst/>
@@ -2244,7 +2070,7 @@
               </a:lnSpc>
             </a:pPr>
             <a:r>
-              <a:rPr b="0" lang="en-US" sz="1200" spc="-1" strike="noStrike">
+              <a:rPr b="1" lang="en-US" sz="1200" spc="-1" strike="noStrike">
                 <a:solidFill>
                   <a:srgbClr val="000000"/>
                 </a:solidFill>
@@ -2253,69 +2079,104 @@
               </a:rPr>
               <a:t>BonadroneBoard</a:t>
             </a:r>
-            <a:endParaRPr b="0" lang="en-US" sz="1200" spc="-1" strike="noStrike">
-              <a:latin typeface="Arial"/>
-            </a:endParaRPr>
-          </a:p>
-        </p:txBody>
-      </p:sp>
-      <p:cxnSp>
-        <p:nvCxnSpPr>
-          <p:cNvPr id="53" name="Line 16"/>
-          <p:cNvCxnSpPr>
-            <a:stCxn id="40" idx="2"/>
-            <a:endCxn id="52" idx="0"/>
-          </p:cNvCxnSpPr>
-          <p:nvPr/>
-        </p:nvCxnSpPr>
+            <a:endParaRPr b="1" lang="en-US" sz="1200" spc="-1" strike="noStrike">
+              <a:latin typeface="Arial"/>
+            </a:endParaRPr>
+          </a:p>
+        </p:txBody>
+      </p:sp>
+      <p:sp>
+        <p:nvSpPr>
+          <p:cNvPr id="51" name="CustomShape 16"/>
+          <p:cNvSpPr/>
+          <p:nvPr/>
+        </p:nvSpPr>
         <p:spPr>
           <a:xfrm>
             <a:off x="3120120" y="2783520"/>
-            <a:ext cx="1485720" cy="910440"/>
-          </a:xfrm>
-          <a:prstGeom prst="straightConnector1">
-            <a:avLst/>
-          </a:prstGeom>
+            <a:ext cx="1485360" cy="910080"/>
+          </a:xfrm>
+          <a:custGeom>
+            <a:avLst/>
+            <a:gdLst/>
+            <a:ahLst/>
+            <a:rect l="l" t="t" r="r" b="b"/>
+            <a:pathLst>
+              <a:path w="21600" h="21600">
+                <a:moveTo>
+                  <a:pt x="0" y="0"/>
+                </a:moveTo>
+                <a:lnTo>
+                  <a:pt x="21600" y="21600"/>
+                </a:lnTo>
+              </a:path>
+            </a:pathLst>
+          </a:custGeom>
+          <a:noFill/>
           <a:ln>
             <a:solidFill>
               <a:srgbClr val="000000"/>
             </a:solidFill>
           </a:ln>
         </p:spPr>
-      </p:cxnSp>
-      <p:cxnSp>
-        <p:nvCxnSpPr>
-          <p:cNvPr id="54" name="Line 17"/>
-          <p:cNvCxnSpPr>
-            <a:stCxn id="52" idx="2"/>
-          </p:cNvCxnSpPr>
-          <p:nvPr/>
-        </p:nvCxnSpPr>
+        <p:style>
+          <a:lnRef idx="0"/>
+          <a:fillRef idx="0"/>
+          <a:effectRef idx="0"/>
+          <a:fontRef idx="minor"/>
+        </p:style>
+      </p:sp>
+      <p:sp>
+        <p:nvSpPr>
+          <p:cNvPr id="52" name="CustomShape 17"/>
+          <p:cNvSpPr/>
+          <p:nvPr/>
+        </p:nvSpPr>
         <p:spPr>
           <a:xfrm flipH="1">
-            <a:off x="3706560" y="4008240"/>
-            <a:ext cx="899280" cy="392760"/>
-          </a:xfrm>
-          <a:prstGeom prst="straightConnector1">
-            <a:avLst/>
-          </a:prstGeom>
+            <a:off x="3705840" y="4008240"/>
+            <a:ext cx="898920" cy="392400"/>
+          </a:xfrm>
+          <a:custGeom>
+            <a:avLst/>
+            <a:gdLst/>
+            <a:ahLst/>
+            <a:rect l="l" t="t" r="r" b="b"/>
+            <a:pathLst>
+              <a:path w="21600" h="21600">
+                <a:moveTo>
+                  <a:pt x="0" y="0"/>
+                </a:moveTo>
+                <a:lnTo>
+                  <a:pt x="21600" y="21600"/>
+                </a:lnTo>
+              </a:path>
+            </a:pathLst>
+          </a:custGeom>
+          <a:noFill/>
           <a:ln>
             <a:solidFill>
               <a:srgbClr val="000000"/>
             </a:solidFill>
           </a:ln>
         </p:spPr>
-      </p:cxnSp>
-      <p:sp>
-        <p:nvSpPr>
-          <p:cNvPr id="55" name="CustomShape 18"/>
+        <p:style>
+          <a:lnRef idx="0"/>
+          <a:fillRef idx="0"/>
+          <a:effectRef idx="0"/>
+          <a:fontRef idx="minor"/>
+        </p:style>
+      </p:sp>
+      <p:sp>
+        <p:nvSpPr>
+          <p:cNvPr id="53" name="CustomShape 18"/>
           <p:cNvSpPr/>
           <p:nvPr/>
         </p:nvSpPr>
         <p:spPr>
           <a:xfrm>
             <a:off x="3206880" y="4400640"/>
-            <a:ext cx="999360" cy="314640"/>
+            <a:ext cx="999000" cy="314280"/>
           </a:xfrm>
           <a:prstGeom prst="rect">
             <a:avLst/>
@@ -2340,7 +2201,7 @@
               </a:lnSpc>
             </a:pPr>
             <a:r>
-              <a:rPr b="0" lang="en-US" sz="1200" spc="-1" strike="noStrike">
+              <a:rPr b="1" lang="en-US" sz="1200" spc="-1" strike="noStrike">
                 <a:solidFill>
                   <a:srgbClr val="000000"/>
                 </a:solidFill>
@@ -2349,22 +2210,22 @@
               </a:rPr>
               <a:t>BonadroneStandard</a:t>
             </a:r>
-            <a:endParaRPr b="0" lang="en-US" sz="1200" spc="-1" strike="noStrike">
-              <a:latin typeface="Arial"/>
-            </a:endParaRPr>
-          </a:p>
-        </p:txBody>
-      </p:sp>
-      <p:sp>
-        <p:nvSpPr>
-          <p:cNvPr id="56" name="CustomShape 19"/>
+            <a:endParaRPr b="1" lang="en-US" sz="1200" spc="-1" strike="noStrike">
+              <a:latin typeface="Arial"/>
+            </a:endParaRPr>
+          </a:p>
+        </p:txBody>
+      </p:sp>
+      <p:sp>
+        <p:nvSpPr>
+          <p:cNvPr id="54" name="CustomShape 19"/>
           <p:cNvSpPr/>
           <p:nvPr/>
         </p:nvSpPr>
         <p:spPr>
           <a:xfrm>
             <a:off x="4070880" y="4394880"/>
-            <a:ext cx="1103760" cy="314640"/>
+            <a:ext cx="1103400" cy="314280"/>
           </a:xfrm>
           <a:prstGeom prst="rect">
             <a:avLst/>
@@ -2389,7 +2250,7 @@
               </a:lnSpc>
             </a:pPr>
             <a:r>
-              <a:rPr b="0" lang="en-US" sz="1200" spc="-1" strike="noStrike">
+              <a:rPr b="1" lang="en-US" sz="1200" spc="-1" strike="noStrike">
                 <a:solidFill>
                   <a:srgbClr val="000000"/>
                 </a:solidFill>
@@ -2398,22 +2259,22 @@
               </a:rPr>
               <a:t>Bonadrone Multishot</a:t>
             </a:r>
-            <a:endParaRPr b="0" lang="en-US" sz="1200" spc="-1" strike="noStrike">
-              <a:latin typeface="Arial"/>
-            </a:endParaRPr>
-          </a:p>
-        </p:txBody>
-      </p:sp>
-      <p:sp>
-        <p:nvSpPr>
-          <p:cNvPr id="57" name="CustomShape 20"/>
+            <a:endParaRPr b="1" lang="en-US" sz="1200" spc="-1" strike="noStrike">
+              <a:latin typeface="Arial"/>
+            </a:endParaRPr>
+          </a:p>
+        </p:txBody>
+      </p:sp>
+      <p:sp>
+        <p:nvSpPr>
+          <p:cNvPr id="55" name="CustomShape 20"/>
           <p:cNvSpPr/>
           <p:nvPr/>
         </p:nvSpPr>
         <p:spPr>
           <a:xfrm>
             <a:off x="5006880" y="4394880"/>
-            <a:ext cx="1103760" cy="314640"/>
+            <a:ext cx="1103400" cy="314280"/>
           </a:xfrm>
           <a:prstGeom prst="rect">
             <a:avLst/>
@@ -2438,7 +2299,7 @@
               </a:lnSpc>
             </a:pPr>
             <a:r>
-              <a:rPr b="0" lang="en-US" sz="1200" spc="-1" strike="noStrike">
+              <a:rPr b="1" lang="en-US" sz="1200" spc="-1" strike="noStrike">
                 <a:solidFill>
                   <a:srgbClr val="000000"/>
                 </a:solidFill>
@@ -2447,70 +2308,104 @@
               </a:rPr>
               <a:t>Bonadrone Brushed</a:t>
             </a:r>
-            <a:endParaRPr b="0" lang="en-US" sz="1200" spc="-1" strike="noStrike">
-              <a:latin typeface="Arial"/>
-            </a:endParaRPr>
-          </a:p>
-        </p:txBody>
-      </p:sp>
-      <p:cxnSp>
-        <p:nvCxnSpPr>
-          <p:cNvPr id="58" name="Line 21"/>
-          <p:cNvCxnSpPr>
-            <a:stCxn id="52" idx="2"/>
-            <a:endCxn id="56" idx="0"/>
-          </p:cNvCxnSpPr>
-          <p:nvPr/>
-        </p:nvCxnSpPr>
+            <a:endParaRPr b="1" lang="en-US" sz="1200" spc="-1" strike="noStrike">
+              <a:latin typeface="Arial"/>
+            </a:endParaRPr>
+          </a:p>
+        </p:txBody>
+      </p:sp>
+      <p:sp>
+        <p:nvSpPr>
+          <p:cNvPr id="56" name="CustomShape 21"/>
+          <p:cNvSpPr/>
+          <p:nvPr/>
+        </p:nvSpPr>
         <p:spPr>
           <a:xfrm>
             <a:off x="4605480" y="4008240"/>
-            <a:ext cx="17640" cy="387000"/>
-          </a:xfrm>
-          <a:prstGeom prst="straightConnector1">
-            <a:avLst/>
-          </a:prstGeom>
+            <a:ext cx="17280" cy="386640"/>
+          </a:xfrm>
+          <a:custGeom>
+            <a:avLst/>
+            <a:gdLst/>
+            <a:ahLst/>
+            <a:rect l="l" t="t" r="r" b="b"/>
+            <a:pathLst>
+              <a:path w="21600" h="21600">
+                <a:moveTo>
+                  <a:pt x="0" y="0"/>
+                </a:moveTo>
+                <a:lnTo>
+                  <a:pt x="21600" y="21600"/>
+                </a:lnTo>
+              </a:path>
+            </a:pathLst>
+          </a:custGeom>
+          <a:noFill/>
           <a:ln>
             <a:solidFill>
               <a:srgbClr val="000000"/>
             </a:solidFill>
           </a:ln>
         </p:spPr>
-      </p:cxnSp>
-      <p:cxnSp>
-        <p:nvCxnSpPr>
-          <p:cNvPr id="59" name="Line 22"/>
-          <p:cNvCxnSpPr>
-            <a:stCxn id="52" idx="2"/>
-            <a:endCxn id="57" idx="0"/>
-          </p:cNvCxnSpPr>
-          <p:nvPr/>
-        </p:nvCxnSpPr>
+        <p:style>
+          <a:lnRef idx="0"/>
+          <a:fillRef idx="0"/>
+          <a:effectRef idx="0"/>
+          <a:fontRef idx="minor"/>
+        </p:style>
+      </p:sp>
+      <p:sp>
+        <p:nvSpPr>
+          <p:cNvPr id="57" name="CustomShape 22"/>
+          <p:cNvSpPr/>
+          <p:nvPr/>
+        </p:nvSpPr>
         <p:spPr>
           <a:xfrm>
             <a:off x="4605480" y="4008240"/>
-            <a:ext cx="953640" cy="387000"/>
-          </a:xfrm>
-          <a:prstGeom prst="straightConnector1">
-            <a:avLst/>
-          </a:prstGeom>
+            <a:ext cx="953280" cy="386640"/>
+          </a:xfrm>
+          <a:custGeom>
+            <a:avLst/>
+            <a:gdLst/>
+            <a:ahLst/>
+            <a:rect l="l" t="t" r="r" b="b"/>
+            <a:pathLst>
+              <a:path w="21600" h="21600">
+                <a:moveTo>
+                  <a:pt x="0" y="0"/>
+                </a:moveTo>
+                <a:lnTo>
+                  <a:pt x="21600" y="21600"/>
+                </a:lnTo>
+              </a:path>
+            </a:pathLst>
+          </a:custGeom>
+          <a:noFill/>
           <a:ln>
             <a:solidFill>
               <a:srgbClr val="000000"/>
             </a:solidFill>
           </a:ln>
         </p:spPr>
-      </p:cxnSp>
-      <p:sp>
-        <p:nvSpPr>
-          <p:cNvPr id="60" name="CustomShape 23"/>
+        <p:style>
+          <a:lnRef idx="0"/>
+          <a:fillRef idx="0"/>
+          <a:effectRef idx="0"/>
+          <a:fontRef idx="minor"/>
+        </p:style>
+      </p:sp>
+      <p:sp>
+        <p:nvSpPr>
+          <p:cNvPr id="58" name="CustomShape 23"/>
           <p:cNvSpPr/>
           <p:nvPr/>
         </p:nvSpPr>
         <p:spPr>
           <a:xfrm>
             <a:off x="1838880" y="3657600"/>
-            <a:ext cx="1440720" cy="314640"/>
+            <a:ext cx="1440360" cy="314280"/>
           </a:xfrm>
           <a:prstGeom prst="rect">
             <a:avLst/>
@@ -2535,7 +2430,7 @@
               </a:lnSpc>
             </a:pPr>
             <a:r>
-              <a:rPr b="0" lang="en-US" sz="1200" spc="-1" strike="noStrike">
+              <a:rPr b="1" lang="en-US" sz="1200" spc="-1" strike="noStrike">
                 <a:solidFill>
                   <a:srgbClr val="000000"/>
                 </a:solidFill>
@@ -2544,46 +2439,63 @@
               </a:rPr>
               <a:t>MockBoard</a:t>
             </a:r>
-            <a:endParaRPr b="0" lang="en-US" sz="1200" spc="-1" strike="noStrike">
-              <a:latin typeface="Arial"/>
-            </a:endParaRPr>
-          </a:p>
-        </p:txBody>
-      </p:sp>
-      <p:cxnSp>
-        <p:nvCxnSpPr>
-          <p:cNvPr id="61" name="Line 24"/>
-          <p:cNvCxnSpPr>
-            <a:stCxn id="40" idx="2"/>
-            <a:endCxn id="60" idx="0"/>
-          </p:cNvCxnSpPr>
-          <p:nvPr/>
-        </p:nvCxnSpPr>
+            <a:endParaRPr b="1" lang="en-US" sz="1200" spc="-1" strike="noStrike">
+              <a:latin typeface="Arial"/>
+            </a:endParaRPr>
+          </a:p>
+        </p:txBody>
+      </p:sp>
+      <p:sp>
+        <p:nvSpPr>
+          <p:cNvPr id="59" name="CustomShape 24"/>
+          <p:cNvSpPr/>
+          <p:nvPr/>
+        </p:nvSpPr>
         <p:spPr>
           <a:xfrm flipH="1">
             <a:off x="2559240" y="2783520"/>
-            <a:ext cx="561240" cy="874440"/>
-          </a:xfrm>
-          <a:prstGeom prst="straightConnector1">
-            <a:avLst/>
-          </a:prstGeom>
+            <a:ext cx="560880" cy="874080"/>
+          </a:xfrm>
+          <a:custGeom>
+            <a:avLst/>
+            <a:gdLst/>
+            <a:ahLst/>
+            <a:rect l="l" t="t" r="r" b="b"/>
+            <a:pathLst>
+              <a:path w="21600" h="21600">
+                <a:moveTo>
+                  <a:pt x="0" y="0"/>
+                </a:moveTo>
+                <a:lnTo>
+                  <a:pt x="21600" y="21600"/>
+                </a:lnTo>
+              </a:path>
+            </a:pathLst>
+          </a:custGeom>
+          <a:noFill/>
           <a:ln>
             <a:solidFill>
               <a:srgbClr val="000000"/>
             </a:solidFill>
           </a:ln>
         </p:spPr>
-      </p:cxnSp>
-      <p:sp>
-        <p:nvSpPr>
-          <p:cNvPr id="62" name="CustomShape 25"/>
+        <p:style>
+          <a:lnRef idx="0"/>
+          <a:fillRef idx="0"/>
+          <a:effectRef idx="0"/>
+          <a:fontRef idx="minor"/>
+        </p:style>
+      </p:sp>
+      <p:sp>
+        <p:nvSpPr>
+          <p:cNvPr id="60" name="CustomShape 25"/>
           <p:cNvSpPr/>
           <p:nvPr/>
         </p:nvSpPr>
         <p:spPr>
           <a:xfrm>
             <a:off x="1576080" y="4400640"/>
-            <a:ext cx="1103760" cy="314640"/>
+            <a:ext cx="1103400" cy="314280"/>
           </a:xfrm>
           <a:prstGeom prst="rect">
             <a:avLst/>
@@ -2608,7 +2520,7 @@
               </a:lnSpc>
             </a:pPr>
             <a:r>
-              <a:rPr b="0" lang="en-US" sz="1200" spc="-1" strike="noStrike">
+              <a:rPr b="1" lang="en-US" sz="1200" spc="-1" strike="noStrike">
                 <a:solidFill>
                   <a:srgbClr val="000000"/>
                 </a:solidFill>
@@ -2617,46 +2529,63 @@
               </a:rPr>
               <a:t>Dragonfly</a:t>
             </a:r>
-            <a:endParaRPr b="0" lang="en-US" sz="1200" spc="-1" strike="noStrike">
-              <a:latin typeface="Arial"/>
-            </a:endParaRPr>
-          </a:p>
-        </p:txBody>
-      </p:sp>
-      <p:cxnSp>
-        <p:nvCxnSpPr>
-          <p:cNvPr id="63" name="Line 26"/>
-          <p:cNvCxnSpPr>
-            <a:stCxn id="60" idx="2"/>
-            <a:endCxn id="62" idx="0"/>
-          </p:cNvCxnSpPr>
-          <p:nvPr/>
-        </p:nvCxnSpPr>
+            <a:endParaRPr b="1" lang="en-US" sz="1200" spc="-1" strike="noStrike">
+              <a:latin typeface="Arial"/>
+            </a:endParaRPr>
+          </a:p>
+        </p:txBody>
+      </p:sp>
+      <p:sp>
+        <p:nvSpPr>
+          <p:cNvPr id="61" name="CustomShape 26"/>
+          <p:cNvSpPr/>
+          <p:nvPr/>
+        </p:nvSpPr>
         <p:spPr>
           <a:xfrm flipH="1">
             <a:off x="2127960" y="3972240"/>
-            <a:ext cx="431640" cy="428760"/>
-          </a:xfrm>
-          <a:prstGeom prst="straightConnector1">
-            <a:avLst/>
-          </a:prstGeom>
+            <a:ext cx="431280" cy="428400"/>
+          </a:xfrm>
+          <a:custGeom>
+            <a:avLst/>
+            <a:gdLst/>
+            <a:ahLst/>
+            <a:rect l="l" t="t" r="r" b="b"/>
+            <a:pathLst>
+              <a:path w="21600" h="21600">
+                <a:moveTo>
+                  <a:pt x="0" y="0"/>
+                </a:moveTo>
+                <a:lnTo>
+                  <a:pt x="21600" y="21600"/>
+                </a:lnTo>
+              </a:path>
+            </a:pathLst>
+          </a:custGeom>
+          <a:noFill/>
           <a:ln>
             <a:solidFill>
               <a:srgbClr val="000000"/>
             </a:solidFill>
           </a:ln>
         </p:spPr>
-      </p:cxnSp>
-      <p:sp>
-        <p:nvSpPr>
-          <p:cNvPr id="64" name="CustomShape 27"/>
+        <p:style>
+          <a:lnRef idx="0"/>
+          <a:fillRef idx="0"/>
+          <a:effectRef idx="0"/>
+          <a:fontRef idx="minor"/>
+        </p:style>
+      </p:sp>
+      <p:sp>
+        <p:nvSpPr>
+          <p:cNvPr id="62" name="CustomShape 27"/>
           <p:cNvSpPr/>
           <p:nvPr/>
         </p:nvSpPr>
         <p:spPr>
           <a:xfrm>
             <a:off x="2365920" y="4400640"/>
-            <a:ext cx="1103760" cy="314640"/>
+            <a:ext cx="1103400" cy="314280"/>
           </a:xfrm>
           <a:prstGeom prst="rect">
             <a:avLst/>
@@ -2681,7 +2610,7 @@
               </a:lnSpc>
             </a:pPr>
             <a:r>
-              <a:rPr b="0" lang="en-US" sz="1200" spc="-1" strike="noStrike">
+              <a:rPr b="1" lang="en-US" sz="1200" spc="-1" strike="noStrike">
                 <a:solidFill>
                   <a:srgbClr val="000000"/>
                 </a:solidFill>
@@ -2690,46 +2619,63 @@
               </a:rPr>
               <a:t>ThingDev</a:t>
             </a:r>
-            <a:endParaRPr b="0" lang="en-US" sz="1200" spc="-1" strike="noStrike">
-              <a:latin typeface="Arial"/>
-            </a:endParaRPr>
-          </a:p>
-        </p:txBody>
-      </p:sp>
-      <p:cxnSp>
-        <p:nvCxnSpPr>
-          <p:cNvPr id="65" name="Line 28"/>
-          <p:cNvCxnSpPr>
-            <a:stCxn id="60" idx="2"/>
-            <a:endCxn id="64" idx="0"/>
-          </p:cNvCxnSpPr>
-          <p:nvPr/>
-        </p:nvCxnSpPr>
+            <a:endParaRPr b="1" lang="en-US" sz="1200" spc="-1" strike="noStrike">
+              <a:latin typeface="Arial"/>
+            </a:endParaRPr>
+          </a:p>
+        </p:txBody>
+      </p:sp>
+      <p:sp>
+        <p:nvSpPr>
+          <p:cNvPr id="63" name="CustomShape 28"/>
+          <p:cNvSpPr/>
+          <p:nvPr/>
+        </p:nvSpPr>
         <p:spPr>
           <a:xfrm>
             <a:off x="2559240" y="3972240"/>
-            <a:ext cx="358920" cy="428760"/>
-          </a:xfrm>
-          <a:prstGeom prst="straightConnector1">
-            <a:avLst/>
-          </a:prstGeom>
+            <a:ext cx="358560" cy="428400"/>
+          </a:xfrm>
+          <a:custGeom>
+            <a:avLst/>
+            <a:gdLst/>
+            <a:ahLst/>
+            <a:rect l="l" t="t" r="r" b="b"/>
+            <a:pathLst>
+              <a:path w="21600" h="21600">
+                <a:moveTo>
+                  <a:pt x="0" y="0"/>
+                </a:moveTo>
+                <a:lnTo>
+                  <a:pt x="21600" y="21600"/>
+                </a:lnTo>
+              </a:path>
+            </a:pathLst>
+          </a:custGeom>
+          <a:noFill/>
           <a:ln>
             <a:solidFill>
               <a:srgbClr val="000000"/>
             </a:solidFill>
           </a:ln>
         </p:spPr>
-      </p:cxnSp>
-      <p:sp>
-        <p:nvSpPr>
-          <p:cNvPr id="66" name="CustomShape 29"/>
+        <p:style>
+          <a:lnRef idx="0"/>
+          <a:fillRef idx="0"/>
+          <a:effectRef idx="0"/>
+          <a:fontRef idx="minor"/>
+        </p:style>
+      </p:sp>
+      <p:sp>
+        <p:nvSpPr>
+          <p:cNvPr id="64" name="CustomShape 29"/>
           <p:cNvSpPr/>
           <p:nvPr/>
         </p:nvSpPr>
         <p:spPr>
           <a:xfrm>
             <a:off x="6625440" y="3686400"/>
-            <a:ext cx="1404000" cy="314640"/>
+            <a:ext cx="1403640" cy="314280"/>
           </a:xfrm>
           <a:prstGeom prst="rect">
             <a:avLst/>
@@ -2754,113 +2700,154 @@
               </a:lnSpc>
             </a:pPr>
             <a:r>
-              <a:rPr b="0" lang="en-US" sz="1200" spc="-1" strike="noStrike">
+              <a:rPr b="1" lang="en-US" sz="1200" spc="-1" strike="noStrike">
                 <a:solidFill>
                   <a:srgbClr val="000000"/>
                 </a:solidFill>
                 <a:latin typeface="Arial"/>
                 <a:ea typeface="DejaVu Sans"/>
               </a:rPr>
-              <a:t>STM32FB</a:t>
+              <a:t>STM32FBoard</a:t>
             </a:r>
-            <a:r>
-              <a:rPr b="0" lang="en-US" sz="1200" spc="-1" strike="noStrike">
-                <a:solidFill>
-                  <a:srgbClr val="000000"/>
-                </a:solidFill>
-                <a:latin typeface="Arial"/>
-                <a:ea typeface="DejaVu Sans"/>
-              </a:rPr>
-              <a:t>oard</a:t>
-            </a:r>
-            <a:endParaRPr b="0" lang="en-US" sz="1200" spc="-1" strike="noStrike">
-              <a:latin typeface="Arial"/>
-            </a:endParaRPr>
-          </a:p>
-        </p:txBody>
-      </p:sp>
-      <p:cxnSp>
-        <p:nvCxnSpPr>
-          <p:cNvPr id="67" name="Line 30"/>
-          <p:cNvCxnSpPr>
-            <a:stCxn id="66" idx="0"/>
-            <a:endCxn id="39" idx="2"/>
-          </p:cNvCxnSpPr>
-          <p:nvPr/>
-        </p:nvCxnSpPr>
+            <a:endParaRPr b="1" lang="en-US" sz="1200" spc="-1" strike="noStrike">
+              <a:latin typeface="Arial"/>
+            </a:endParaRPr>
+          </a:p>
+        </p:txBody>
+      </p:sp>
+      <p:sp>
+        <p:nvSpPr>
+          <p:cNvPr id="65" name="CustomShape 30"/>
+          <p:cNvSpPr/>
+          <p:nvPr/>
+        </p:nvSpPr>
         <p:spPr>
           <a:xfrm flipH="1" flipV="1">
-            <a:off x="5483520" y="1827720"/>
-            <a:ext cx="1844280" cy="1859040"/>
-          </a:xfrm>
-          <a:prstGeom prst="straightConnector1">
-            <a:avLst/>
-          </a:prstGeom>
+            <a:off x="5483520" y="1827000"/>
+            <a:ext cx="1843920" cy="1858680"/>
+          </a:xfrm>
+          <a:custGeom>
+            <a:avLst/>
+            <a:gdLst/>
+            <a:ahLst/>
+            <a:rect l="l" t="t" r="r" b="b"/>
+            <a:pathLst>
+              <a:path w="21600" h="21600">
+                <a:moveTo>
+                  <a:pt x="0" y="0"/>
+                </a:moveTo>
+                <a:lnTo>
+                  <a:pt x="21600" y="21600"/>
+                </a:lnTo>
+              </a:path>
+            </a:pathLst>
+          </a:custGeom>
+          <a:noFill/>
           <a:ln>
             <a:solidFill>
               <a:srgbClr val="000000"/>
             </a:solidFill>
           </a:ln>
         </p:spPr>
-      </p:cxnSp>
-      <p:cxnSp>
-        <p:nvCxnSpPr>
-          <p:cNvPr id="68" name="Line 31"/>
-          <p:cNvCxnSpPr>
-            <a:stCxn id="42" idx="2"/>
-            <a:endCxn id="52" idx="0"/>
-          </p:cNvCxnSpPr>
-          <p:nvPr/>
-        </p:nvCxnSpPr>
+        <p:style>
+          <a:lnRef idx="0"/>
+          <a:fillRef idx="0"/>
+          <a:effectRef idx="0"/>
+          <a:fontRef idx="minor"/>
+        </p:style>
+      </p:sp>
+      <p:sp>
+        <p:nvSpPr>
+          <p:cNvPr id="66" name="CustomShape 31"/>
+          <p:cNvSpPr/>
+          <p:nvPr/>
+        </p:nvSpPr>
         <p:spPr>
           <a:xfrm flipH="1">
             <a:off x="4605480" y="2783520"/>
-            <a:ext cx="744120" cy="910440"/>
-          </a:xfrm>
-          <a:prstGeom prst="straightConnector1">
-            <a:avLst/>
-          </a:prstGeom>
+            <a:ext cx="743760" cy="910080"/>
+          </a:xfrm>
+          <a:custGeom>
+            <a:avLst/>
+            <a:gdLst/>
+            <a:ahLst/>
+            <a:rect l="l" t="t" r="r" b="b"/>
+            <a:pathLst>
+              <a:path w="21600" h="21600">
+                <a:moveTo>
+                  <a:pt x="0" y="0"/>
+                </a:moveTo>
+                <a:lnTo>
+                  <a:pt x="21600" y="21600"/>
+                </a:lnTo>
+              </a:path>
+            </a:pathLst>
+          </a:custGeom>
+          <a:noFill/>
           <a:ln>
             <a:solidFill>
               <a:srgbClr val="000000"/>
             </a:solidFill>
           </a:ln>
         </p:spPr>
-      </p:cxnSp>
-      <p:cxnSp>
-        <p:nvCxnSpPr>
-          <p:cNvPr id="69" name="Line 32"/>
-          <p:cNvCxnSpPr>
-            <a:stCxn id="42" idx="2"/>
-            <a:endCxn id="66" idx="0"/>
-          </p:cNvCxnSpPr>
-          <p:nvPr/>
-        </p:nvCxnSpPr>
+        <p:style>
+          <a:lnRef idx="0"/>
+          <a:fillRef idx="0"/>
+          <a:effectRef idx="0"/>
+          <a:fontRef idx="minor"/>
+        </p:style>
+      </p:sp>
+      <p:sp>
+        <p:nvSpPr>
+          <p:cNvPr id="67" name="CustomShape 32"/>
+          <p:cNvSpPr/>
+          <p:nvPr/>
+        </p:nvSpPr>
         <p:spPr>
           <a:xfrm>
             <a:off x="5349240" y="2783520"/>
-            <a:ext cx="1978560" cy="903240"/>
-          </a:xfrm>
-          <a:prstGeom prst="straightConnector1">
-            <a:avLst/>
-          </a:prstGeom>
+            <a:ext cx="1978200" cy="902880"/>
+          </a:xfrm>
+          <a:custGeom>
+            <a:avLst/>
+            <a:gdLst/>
+            <a:ahLst/>
+            <a:rect l="l" t="t" r="r" b="b"/>
+            <a:pathLst>
+              <a:path w="21600" h="21600">
+                <a:moveTo>
+                  <a:pt x="0" y="0"/>
+                </a:moveTo>
+                <a:lnTo>
+                  <a:pt x="21600" y="21600"/>
+                </a:lnTo>
+              </a:path>
+            </a:pathLst>
+          </a:custGeom>
+          <a:noFill/>
           <a:ln>
             <a:solidFill>
               <a:srgbClr val="000000"/>
             </a:solidFill>
           </a:ln>
         </p:spPr>
-      </p:cxnSp>
-      <p:sp>
-        <p:nvSpPr>
-          <p:cNvPr id="70" name="CustomShape 33"/>
+        <p:style>
+          <a:lnRef idx="0"/>
+          <a:fillRef idx="0"/>
+          <a:effectRef idx="0"/>
+          <a:fontRef idx="minor"/>
+        </p:style>
+      </p:sp>
+      <p:sp>
+        <p:nvSpPr>
+          <p:cNvPr id="68" name="CustomShape 33"/>
           <p:cNvSpPr/>
           <p:nvPr/>
         </p:nvSpPr>
         <p:spPr>
           <a:xfrm>
             <a:off x="5894640" y="4389120"/>
-            <a:ext cx="1404000" cy="314640"/>
+            <a:ext cx="1403640" cy="314280"/>
           </a:xfrm>
           <a:prstGeom prst="rect">
             <a:avLst/>
@@ -2885,7 +2872,7 @@
               </a:lnSpc>
             </a:pPr>
             <a:r>
-              <a:rPr b="0" lang="en-US" sz="1200" spc="-1" strike="noStrike">
+              <a:rPr b="1" lang="en-US" sz="1200" spc="-1" strike="noStrike">
                 <a:solidFill>
                   <a:srgbClr val="000000"/>
                 </a:solidFill>
@@ -2894,46 +2881,63 @@
               </a:rPr>
               <a:t>OmnibusF3</a:t>
             </a:r>
-            <a:endParaRPr b="0" lang="en-US" sz="1200" spc="-1" strike="noStrike">
-              <a:latin typeface="Arial"/>
-            </a:endParaRPr>
-          </a:p>
-        </p:txBody>
-      </p:sp>
-      <p:cxnSp>
-        <p:nvCxnSpPr>
-          <p:cNvPr id="71" name="Line 34"/>
-          <p:cNvCxnSpPr>
-            <a:stCxn id="66" idx="2"/>
-            <a:endCxn id="70" idx="0"/>
-          </p:cNvCxnSpPr>
-          <p:nvPr/>
-        </p:nvCxnSpPr>
+            <a:endParaRPr b="1" lang="en-US" sz="1200" spc="-1" strike="noStrike">
+              <a:latin typeface="Arial"/>
+            </a:endParaRPr>
+          </a:p>
+        </p:txBody>
+      </p:sp>
+      <p:sp>
+        <p:nvSpPr>
+          <p:cNvPr id="69" name="CustomShape 34"/>
+          <p:cNvSpPr/>
+          <p:nvPr/>
+        </p:nvSpPr>
         <p:spPr>
           <a:xfrm flipH="1">
             <a:off x="6596640" y="4001040"/>
-            <a:ext cx="731160" cy="388440"/>
-          </a:xfrm>
-          <a:prstGeom prst="straightConnector1">
-            <a:avLst/>
-          </a:prstGeom>
+            <a:ext cx="730800" cy="388080"/>
+          </a:xfrm>
+          <a:custGeom>
+            <a:avLst/>
+            <a:gdLst/>
+            <a:ahLst/>
+            <a:rect l="l" t="t" r="r" b="b"/>
+            <a:pathLst>
+              <a:path w="21600" h="21600">
+                <a:moveTo>
+                  <a:pt x="0" y="0"/>
+                </a:moveTo>
+                <a:lnTo>
+                  <a:pt x="21600" y="21600"/>
+                </a:lnTo>
+              </a:path>
+            </a:pathLst>
+          </a:custGeom>
+          <a:noFill/>
           <a:ln>
             <a:solidFill>
               <a:srgbClr val="000000"/>
             </a:solidFill>
           </a:ln>
         </p:spPr>
-      </p:cxnSp>
-      <p:sp>
-        <p:nvSpPr>
-          <p:cNvPr id="72" name="CustomShape 35"/>
+        <p:style>
+          <a:lnRef idx="0"/>
+          <a:fillRef idx="0"/>
+          <a:effectRef idx="0"/>
+          <a:fontRef idx="minor"/>
+        </p:style>
+      </p:sp>
+      <p:sp>
+        <p:nvSpPr>
+          <p:cNvPr id="70" name="CustomShape 35"/>
           <p:cNvSpPr/>
           <p:nvPr/>
         </p:nvSpPr>
         <p:spPr>
           <a:xfrm>
             <a:off x="6866640" y="4389120"/>
-            <a:ext cx="1000800" cy="314640"/>
+            <a:ext cx="1000440" cy="314280"/>
           </a:xfrm>
           <a:prstGeom prst="rect">
             <a:avLst/>
@@ -2958,7 +2962,7 @@
               </a:lnSpc>
             </a:pPr>
             <a:r>
-              <a:rPr b="0" lang="en-US" sz="1200" spc="-1" strike="noStrike">
+              <a:rPr b="1" lang="en-US" sz="1200" spc="-1" strike="noStrike">
                 <a:solidFill>
                   <a:srgbClr val="000000"/>
                 </a:solidFill>
@@ -2967,46 +2971,63 @@
               </a:rPr>
               <a:t>BetaFPVF3</a:t>
             </a:r>
-            <a:endParaRPr b="0" lang="en-US" sz="1200" spc="-1" strike="noStrike">
-              <a:latin typeface="Arial"/>
-            </a:endParaRPr>
-          </a:p>
-        </p:txBody>
-      </p:sp>
-      <p:cxnSp>
-        <p:nvCxnSpPr>
-          <p:cNvPr id="73" name="Line 36"/>
-          <p:cNvCxnSpPr>
-            <a:stCxn id="66" idx="2"/>
-            <a:endCxn id="72" idx="0"/>
-          </p:cNvCxnSpPr>
-          <p:nvPr/>
-        </p:nvCxnSpPr>
+            <a:endParaRPr b="1" lang="en-US" sz="1200" spc="-1" strike="noStrike">
+              <a:latin typeface="Arial"/>
+            </a:endParaRPr>
+          </a:p>
+        </p:txBody>
+      </p:sp>
+      <p:sp>
+        <p:nvSpPr>
+          <p:cNvPr id="71" name="CustomShape 36"/>
+          <p:cNvSpPr/>
+          <p:nvPr/>
+        </p:nvSpPr>
         <p:spPr>
           <a:xfrm>
             <a:off x="7327440" y="4001040"/>
-            <a:ext cx="39960" cy="388440"/>
-          </a:xfrm>
-          <a:prstGeom prst="straightConnector1">
-            <a:avLst/>
-          </a:prstGeom>
+            <a:ext cx="39600" cy="388080"/>
+          </a:xfrm>
+          <a:custGeom>
+            <a:avLst/>
+            <a:gdLst/>
+            <a:ahLst/>
+            <a:rect l="l" t="t" r="r" b="b"/>
+            <a:pathLst>
+              <a:path w="21600" h="21600">
+                <a:moveTo>
+                  <a:pt x="0" y="0"/>
+                </a:moveTo>
+                <a:lnTo>
+                  <a:pt x="21600" y="21600"/>
+                </a:lnTo>
+              </a:path>
+            </a:pathLst>
+          </a:custGeom>
+          <a:noFill/>
           <a:ln>
             <a:solidFill>
               <a:srgbClr val="000000"/>
             </a:solidFill>
           </a:ln>
         </p:spPr>
-      </p:cxnSp>
-      <p:sp>
-        <p:nvSpPr>
-          <p:cNvPr id="74" name="CustomShape 37"/>
+        <p:style>
+          <a:lnRef idx="0"/>
+          <a:fillRef idx="0"/>
+          <a:effectRef idx="0"/>
+          <a:fontRef idx="minor"/>
+        </p:style>
+      </p:sp>
+      <p:sp>
+        <p:nvSpPr>
+          <p:cNvPr id="72" name="CustomShape 37"/>
           <p:cNvSpPr/>
           <p:nvPr/>
         </p:nvSpPr>
         <p:spPr>
           <a:xfrm>
             <a:off x="7802640" y="4389120"/>
-            <a:ext cx="1216800" cy="314640"/>
+            <a:ext cx="1341360" cy="314280"/>
           </a:xfrm>
           <a:prstGeom prst="rect">
             <a:avLst/>
@@ -3031,7 +3052,7 @@
               </a:lnSpc>
             </a:pPr>
             <a:r>
-              <a:rPr b="0" lang="en-US" sz="1200" spc="-1" strike="noStrike">
+              <a:rPr b="1" lang="en-US" sz="1200" spc="-1" strike="noStrike">
                 <a:solidFill>
                   <a:srgbClr val="000000"/>
                 </a:solidFill>
@@ -3040,46 +3061,63 @@
               </a:rPr>
               <a:t>AlienflightF3V1</a:t>
             </a:r>
-            <a:endParaRPr b="0" lang="en-US" sz="1200" spc="-1" strike="noStrike">
-              <a:latin typeface="Arial"/>
-            </a:endParaRPr>
-          </a:p>
-        </p:txBody>
-      </p:sp>
-      <p:cxnSp>
-        <p:nvCxnSpPr>
-          <p:cNvPr id="75" name="Line 38"/>
-          <p:cNvCxnSpPr>
-            <a:stCxn id="66" idx="2"/>
-            <a:endCxn id="74" idx="0"/>
-          </p:cNvCxnSpPr>
-          <p:nvPr/>
-        </p:nvCxnSpPr>
+            <a:endParaRPr b="1" lang="en-US" sz="1200" spc="-1" strike="noStrike">
+              <a:latin typeface="Arial"/>
+            </a:endParaRPr>
+          </a:p>
+        </p:txBody>
+      </p:sp>
+      <p:sp>
+        <p:nvSpPr>
+          <p:cNvPr id="73" name="CustomShape 38"/>
+          <p:cNvSpPr/>
+          <p:nvPr/>
+        </p:nvSpPr>
         <p:spPr>
           <a:xfrm>
             <a:off x="7327440" y="4001040"/>
-            <a:ext cx="1083960" cy="388440"/>
-          </a:xfrm>
-          <a:prstGeom prst="straightConnector1">
-            <a:avLst/>
-          </a:prstGeom>
+            <a:ext cx="1083600" cy="388080"/>
+          </a:xfrm>
+          <a:custGeom>
+            <a:avLst/>
+            <a:gdLst/>
+            <a:ahLst/>
+            <a:rect l="l" t="t" r="r" b="b"/>
+            <a:pathLst>
+              <a:path w="21600" h="21600">
+                <a:moveTo>
+                  <a:pt x="0" y="0"/>
+                </a:moveTo>
+                <a:lnTo>
+                  <a:pt x="21600" y="21600"/>
+                </a:lnTo>
+              </a:path>
+            </a:pathLst>
+          </a:custGeom>
+          <a:noFill/>
           <a:ln>
             <a:solidFill>
               <a:srgbClr val="000000"/>
             </a:solidFill>
           </a:ln>
         </p:spPr>
-      </p:cxnSp>
-      <p:sp>
-        <p:nvSpPr>
-          <p:cNvPr id="76" name="CustomShape 39"/>
-          <p:cNvSpPr/>
-          <p:nvPr/>
-        </p:nvSpPr>
-        <p:spPr>
-          <a:xfrm>
-            <a:off x="8954640" y="4389120"/>
-            <a:ext cx="796320" cy="314640"/>
+        <p:style>
+          <a:lnRef idx="0"/>
+          <a:fillRef idx="0"/>
+          <a:effectRef idx="0"/>
+          <a:fontRef idx="minor"/>
+        </p:style>
+      </p:sp>
+      <p:sp>
+        <p:nvSpPr>
+          <p:cNvPr id="74" name="CustomShape 39"/>
+          <p:cNvSpPr/>
+          <p:nvPr/>
+        </p:nvSpPr>
+        <p:spPr>
+          <a:xfrm>
+            <a:off x="9026640" y="4389120"/>
+            <a:ext cx="920880" cy="314280"/>
           </a:xfrm>
           <a:prstGeom prst="rect">
             <a:avLst/>
@@ -3104,7 +3142,7 @@
               </a:lnSpc>
             </a:pPr>
             <a:r>
-              <a:rPr b="0" lang="en-US" sz="1200" spc="-1" strike="noStrike">
+              <a:rPr b="1" lang="en-US" sz="1200" spc="-1" strike="noStrike">
                 <a:solidFill>
                   <a:srgbClr val="000000"/>
                 </a:solidFill>
@@ -3113,36 +3151,53 @@
               </a:rPr>
               <a:t>FemtoF3</a:t>
             </a:r>
-            <a:endParaRPr b="0" lang="en-US" sz="1200" spc="-1" strike="noStrike">
-              <a:latin typeface="Arial"/>
-            </a:endParaRPr>
-          </a:p>
-        </p:txBody>
-      </p:sp>
-      <p:cxnSp>
-        <p:nvCxnSpPr>
-          <p:cNvPr id="77" name="Line 40"/>
-          <p:cNvCxnSpPr>
-            <a:stCxn id="66" idx="2"/>
-            <a:endCxn id="76" idx="0"/>
-          </p:cNvCxnSpPr>
-          <p:nvPr/>
-        </p:nvCxnSpPr>
+            <a:endParaRPr b="1" lang="en-US" sz="1200" spc="-1" strike="noStrike">
+              <a:latin typeface="Arial"/>
+            </a:endParaRPr>
+          </a:p>
+        </p:txBody>
+      </p:sp>
+      <p:sp>
+        <p:nvSpPr>
+          <p:cNvPr id="75" name="CustomShape 40"/>
+          <p:cNvSpPr/>
+          <p:nvPr/>
+        </p:nvSpPr>
         <p:spPr>
           <a:xfrm>
             <a:off x="7327440" y="4001040"/>
-            <a:ext cx="2025720" cy="388440"/>
-          </a:xfrm>
-          <a:prstGeom prst="straightConnector1">
-            <a:avLst/>
-          </a:prstGeom>
+            <a:ext cx="2025360" cy="388080"/>
+          </a:xfrm>
+          <a:custGeom>
+            <a:avLst/>
+            <a:gdLst/>
+            <a:ahLst/>
+            <a:rect l="l" t="t" r="r" b="b"/>
+            <a:pathLst>
+              <a:path w="21600" h="21600">
+                <a:moveTo>
+                  <a:pt x="0" y="0"/>
+                </a:moveTo>
+                <a:lnTo>
+                  <a:pt x="21600" y="21600"/>
+                </a:lnTo>
+              </a:path>
+            </a:pathLst>
+          </a:custGeom>
+          <a:noFill/>
           <a:ln>
             <a:solidFill>
               <a:srgbClr val="000000"/>
             </a:solidFill>
           </a:ln>
         </p:spPr>
-      </p:cxnSp>
+        <p:style>
+          <a:lnRef idx="0"/>
+          <a:fillRef idx="0"/>
+          <a:effectRef idx="0"/>
+          <a:fontRef idx="minor"/>
+        </p:style>
+      </p:sp>
     </p:spTree>
   </p:cSld>
   <p:timing>

</xml_diff>